<commit_message>
bold slides final presentation v2
</commit_message>
<xml_diff>
--- a/‏‏Final presentation_v2.pptx
+++ b/‏‏Final presentation_v2.pptx
@@ -557,122 +557,51 @@
           <a:bodyPr/>
           <a:lstStyle/>
           <a:p>
-            <a:pPr marL="0" marR="0" lvl="0" indent="0" algn="l" defTabSz="914400" rtl="1" eaLnBrk="1" fontAlgn="auto" latinLnBrk="0" hangingPunct="1">
-              <a:lnSpc>
-                <a:spcPct val="100000"/>
-              </a:lnSpc>
-              <a:spcBef>
-                <a:spcPts val="0"/>
-              </a:spcBef>
-              <a:spcAft>
-                <a:spcPts val="0"/>
-              </a:spcAft>
-              <a:buClrTx/>
-              <a:buSzTx/>
-              <a:buFontTx/>
-              <a:buNone/>
-              <a:tabLst/>
-              <a:defRPr/>
-            </a:pPr>
-            <a:r>
-              <a:rPr lang="en-US" dirty="0"/>
-              <a:t>latency of four cycles:</a:t>
-            </a:r>
-          </a:p>
-          <a:p>
-            <a:pPr marL="0" marR="0" lvl="0" indent="0" algn="l" defTabSz="914400" rtl="1" eaLnBrk="1" fontAlgn="auto" latinLnBrk="0" hangingPunct="1">
-              <a:lnSpc>
-                <a:spcPct val="100000"/>
-              </a:lnSpc>
-              <a:spcBef>
-                <a:spcPts val="0"/>
-              </a:spcBef>
-              <a:spcAft>
-                <a:spcPts val="0"/>
-              </a:spcAft>
-              <a:buClrTx/>
-              <a:buSzTx/>
-              <a:buFontTx/>
-              <a:buNone/>
-              <a:tabLst/>
-              <a:defRPr/>
-            </a:pPr>
-            <a:r>
-              <a:rPr lang="en-US" dirty="0"/>
-              <a:t>one for reading the data from the RAM,</a:t>
-            </a:r>
-          </a:p>
-          <a:p>
-            <a:pPr marL="0" marR="0" lvl="0" indent="0" algn="l" defTabSz="914400" rtl="1" eaLnBrk="1" fontAlgn="auto" latinLnBrk="0" hangingPunct="1">
-              <a:lnSpc>
-                <a:spcPct val="100000"/>
-              </a:lnSpc>
-              <a:spcBef>
-                <a:spcPts val="0"/>
-              </a:spcBef>
-              <a:spcAft>
-                <a:spcPts val="0"/>
-              </a:spcAft>
-              <a:buClrTx/>
-              <a:buSzTx/>
-              <a:buFontTx/>
-              <a:buNone/>
-              <a:tabLst/>
-              <a:defRPr/>
-            </a:pPr>
-            <a:r>
-              <a:rPr lang="en-US" dirty="0"/>
-              <a:t>one for calculating the distance between the centroid and the point,</a:t>
-            </a:r>
-          </a:p>
-          <a:p>
-            <a:pPr marL="0" marR="0" lvl="0" indent="0" algn="l" defTabSz="914400" rtl="1" eaLnBrk="1" fontAlgn="auto" latinLnBrk="0" hangingPunct="1">
-              <a:lnSpc>
-                <a:spcPct val="100000"/>
-              </a:lnSpc>
-              <a:spcBef>
-                <a:spcPts val="0"/>
-              </a:spcBef>
-              <a:spcAft>
-                <a:spcPts val="0"/>
-              </a:spcAft>
-              <a:buClrTx/>
-              <a:buSzTx/>
-              <a:buFontTx/>
-              <a:buNone/>
-              <a:tabLst/>
-              <a:defRPr/>
-            </a:pPr>
-            <a:r>
-              <a:rPr lang="en-US" dirty="0"/>
-              <a:t>one to determine to closest centroid,</a:t>
-            </a:r>
-          </a:p>
-          <a:p>
-            <a:pPr marL="0" marR="0" lvl="0" indent="0" algn="l" defTabSz="914400" rtl="1" eaLnBrk="1" fontAlgn="auto" latinLnBrk="0" hangingPunct="1">
-              <a:lnSpc>
-                <a:spcPct val="100000"/>
-              </a:lnSpc>
-              <a:spcBef>
-                <a:spcPts val="0"/>
-              </a:spcBef>
-              <a:spcAft>
-                <a:spcPts val="0"/>
-              </a:spcAft>
-              <a:buClrTx/>
-              <a:buSzTx/>
-              <a:buFontTx/>
-              <a:buNone/>
-              <a:tabLst/>
-              <a:defRPr/>
-            </a:pPr>
-            <a:r>
-              <a:rPr lang="en-US" dirty="0"/>
-              <a:t>one for adding to point to the accumulator.</a:t>
-            </a:r>
-          </a:p>
-          <a:p>
             <a:pPr algn="l"/>
+            <a:r>
+              <a:rPr lang="en-US" sz="1200" dirty="0"/>
+              <a:t>Clustering is the classification of an object in different groups, or more precisely, the partitioning of a data set into subsets(clusters), so the data in each subset(ideally) share some common – often according to some defined distance measure.</a:t>
+            </a:r>
+            <a:br>
+              <a:rPr lang="en-US" sz="1200" dirty="0"/>
+            </a:br>
+            <a:endParaRPr lang="en-US" sz="1200" dirty="0"/>
+          </a:p>
+          <a:p>
+            <a:pPr algn="l"/>
+            <a:r>
+              <a:rPr lang="en-US" sz="1200" dirty="0"/>
+              <a:t>K means clustering is a simple partition method to cluster n objects based on attributes into k partitions, where k&lt;n.</a:t>
+            </a:r>
+            <a:br>
+              <a:rPr lang="en-US" sz="1200" dirty="0"/>
+            </a:br>
+            <a:endParaRPr lang="en-US" sz="1200" dirty="0"/>
+          </a:p>
+          <a:p>
+            <a:pPr algn="l"/>
+            <a:r>
+              <a:rPr lang="en-US" sz="1200" dirty="0"/>
+              <a:t>K means clustering widely used in machine learning fields.</a:t>
+            </a:r>
+            <a:br>
+              <a:rPr lang="en-US" sz="1200" dirty="0"/>
+            </a:br>
+            <a:endParaRPr lang="en-US" sz="1200" dirty="0"/>
+          </a:p>
+          <a:p>
+            <a:pPr algn="l"/>
+            <a:r>
+              <a:rPr lang="en-US" sz="1200" dirty="0"/>
+              <a:t>Each cluster is represented by the center of the cluster and the algorithm converges when stabilizing centroids of clusters.</a:t>
+            </a:r>
+          </a:p>
+          <a:p>
+            <a:pPr algn="l"/>
+            <a:endParaRPr lang="en-US" dirty="0"/>
+          </a:p>
+          <a:p>
+            <a:pPr algn="l" rtl="0"/>
             <a:endParaRPr lang="he-IL" dirty="0"/>
           </a:p>
         </p:txBody>
@@ -694,7 +623,7 @@
           <a:p>
             <a:fld id="{A47A8C64-5C8B-40B3-A683-36C8893A9F2F}" type="slidenum">
               <a:rPr lang="he-IL" smtClean="0"/>
-              <a:t>21</a:t>
+              <a:t>4</a:t>
             </a:fld>
             <a:endParaRPr lang="he-IL"/>
           </a:p>
@@ -703,7 +632,7 @@
     </p:spTree>
     <p:extLst>
       <p:ext uri="{BB962C8B-B14F-4D97-AF65-F5344CB8AC3E}">
-        <p14:creationId xmlns:p14="http://schemas.microsoft.com/office/powerpoint/2010/main" val="2858560404"/>
+        <p14:creationId xmlns:p14="http://schemas.microsoft.com/office/powerpoint/2010/main" val="1015321442"/>
       </p:ext>
     </p:extLst>
   </p:cSld>
@@ -742,1759 +671,8 @@
         </p:nvSpPr>
         <p:spPr/>
       </p:sp>
-      <p:sp>
-        <p:nvSpPr>
-          <p:cNvPr id="3" name="מציין מיקום של הערות 2"/>
-          <p:cNvSpPr>
-            <a:spLocks noGrp="1"/>
-          </p:cNvSpPr>
-          <p:nvPr>
-            <p:ph type="body" idx="1"/>
-          </p:nvPr>
-        </p:nvSpPr>
-        <p:spPr/>
-        <p:txBody>
-          <a:bodyPr/>
-          <a:lstStyle/>
-          <a:p>
-            <a:pPr marL="0" marR="0" lvl="0" indent="0" algn="l" defTabSz="914400" rtl="1" eaLnBrk="1" fontAlgn="auto" latinLnBrk="0" hangingPunct="1">
-              <a:lnSpc>
-                <a:spcPct val="100000"/>
-              </a:lnSpc>
-              <a:spcBef>
-                <a:spcPts val="0"/>
-              </a:spcBef>
-              <a:spcAft>
-                <a:spcPts val="0"/>
-              </a:spcAft>
-              <a:buClrTx/>
-              <a:buSzTx/>
-              <a:buFontTx/>
-              <a:buNone/>
-              <a:tabLst/>
-              <a:defRPr/>
-            </a:pPr>
-            <a:r>
-              <a:rPr lang="en-US" dirty="0"/>
-              <a:t>The testbench made in order to verify the implementation of the design described herein was called top_tb.sv. Its structure is as shown below. It is basically composed by an instantiation of the K means TOP (which is the verified DUT), a clock generator and a stimulus generator and driver.</a:t>
-            </a:r>
-          </a:p>
-          <a:p>
-            <a:pPr algn="l"/>
-            <a:endParaRPr lang="he-IL" dirty="0"/>
-          </a:p>
-        </p:txBody>
-      </p:sp>
-      <p:sp>
-        <p:nvSpPr>
-          <p:cNvPr id="4" name="מציין מיקום של מספר שקופית 3"/>
-          <p:cNvSpPr>
-            <a:spLocks noGrp="1"/>
-          </p:cNvSpPr>
-          <p:nvPr>
-            <p:ph type="sldNum" sz="quarter" idx="5"/>
-          </p:nvPr>
-        </p:nvSpPr>
-        <p:spPr/>
-        <p:txBody>
-          <a:bodyPr/>
-          <a:lstStyle/>
-          <a:p>
-            <a:fld id="{A47A8C64-5C8B-40B3-A683-36C8893A9F2F}" type="slidenum">
-              <a:rPr lang="he-IL" smtClean="0"/>
-              <a:t>38</a:t>
-            </a:fld>
-            <a:endParaRPr lang="he-IL"/>
-          </a:p>
-        </p:txBody>
-      </p:sp>
-    </p:spTree>
-    <p:extLst>
-      <p:ext uri="{BB962C8B-B14F-4D97-AF65-F5344CB8AC3E}">
-        <p14:creationId xmlns:p14="http://schemas.microsoft.com/office/powerpoint/2010/main" val="2073914197"/>
-      </p:ext>
-    </p:extLst>
-  </p:cSld>
-  <p:clrMapOvr>
-    <a:masterClrMapping/>
-  </p:clrMapOvr>
-</p:notes>
-</file>
-
-<file path=ppt/notesSlides/notesSlide11.xml><?xml version="1.0" encoding="utf-8"?>
-<p:notes xmlns:a="http://schemas.openxmlformats.org/drawingml/2006/main" xmlns:r="http://schemas.openxmlformats.org/officeDocument/2006/relationships" xmlns:p="http://schemas.openxmlformats.org/presentationml/2006/main">
-  <p:cSld>
-    <p:spTree>
-      <p:nvGrpSpPr>
-        <p:cNvPr id="1" name=""/>
-        <p:cNvGrpSpPr/>
-        <p:nvPr/>
-      </p:nvGrpSpPr>
-      <p:grpSpPr>
-        <a:xfrm>
-          <a:off x="0" y="0"/>
-          <a:ext cx="0" cy="0"/>
-          <a:chOff x="0" y="0"/>
-          <a:chExt cx="0" cy="0"/>
-        </a:xfrm>
-      </p:grpSpPr>
-      <p:sp>
-        <p:nvSpPr>
-          <p:cNvPr id="2" name="מציין מיקום של תמונת שקופית 1"/>
-          <p:cNvSpPr>
-            <a:spLocks noGrp="1" noRot="1" noChangeAspect="1"/>
-          </p:cNvSpPr>
-          <p:nvPr>
-            <p:ph type="sldImg"/>
-          </p:nvPr>
-        </p:nvSpPr>
-        <p:spPr/>
-      </p:sp>
-      <p:sp>
-        <p:nvSpPr>
-          <p:cNvPr id="3" name="מציין מיקום של הערות 2"/>
-          <p:cNvSpPr>
-            <a:spLocks noGrp="1"/>
-          </p:cNvSpPr>
-          <p:nvPr>
-            <p:ph type="body" idx="1"/>
-          </p:nvPr>
-        </p:nvSpPr>
-        <p:spPr/>
-        <p:txBody>
-          <a:bodyPr/>
-          <a:lstStyle/>
-          <a:p>
-            <a:pPr algn="l"/>
-            <a:r>
-              <a:rPr lang="en-US" dirty="0"/>
-              <a:t>The main parts of the IP functionality were marked In the attached figure.</a:t>
-            </a:r>
-          </a:p>
-          <a:p>
-            <a:pPr algn="l"/>
-            <a:r>
-              <a:rPr lang="en-US" dirty="0"/>
-              <a:t>First, the testbench configures the centroid’s registers with their initial value, as well as the registers which contain the RAM first and final addresses. This part was named “Configure registers” in the attached figure.</a:t>
-            </a:r>
-          </a:p>
-          <a:p>
-            <a:pPr algn="l"/>
-            <a:r>
-              <a:rPr lang="en-US" dirty="0"/>
-              <a:t>Then, the testbench writes the data point to the RAM via indirect access. This part was named “Indirect writing to RAM” in the attached figure.</a:t>
-            </a:r>
-          </a:p>
-          <a:p>
-            <a:pPr algn="l"/>
-            <a:r>
-              <a:rPr lang="en-US" dirty="0"/>
-              <a:t>Finally, in the attached figure, in the part called “Algorithm calculation”, centroid registers, accumulators and accumulator counters can be seen changing with the progress of the algorithm. Also, in this part, the “Has converged” signal was marked in its rising edge, meaning the algorithm has reached convergence. Eight clock cycles after this occurs, the “interrupt” signal was marked in its rising edge, meaning the core is communicating to its host that it has finished its purpose.</a:t>
-            </a:r>
-          </a:p>
-          <a:p>
-            <a:pPr algn="l"/>
-            <a:endParaRPr lang="en-US" dirty="0"/>
-          </a:p>
-          <a:p>
-            <a:pPr algn="l"/>
-            <a:endParaRPr lang="he-IL" dirty="0"/>
-          </a:p>
-        </p:txBody>
-      </p:sp>
-      <p:sp>
-        <p:nvSpPr>
-          <p:cNvPr id="4" name="מציין מיקום של מספר שקופית 3"/>
-          <p:cNvSpPr>
-            <a:spLocks noGrp="1"/>
-          </p:cNvSpPr>
-          <p:nvPr>
-            <p:ph type="sldNum" sz="quarter" idx="5"/>
-          </p:nvPr>
-        </p:nvSpPr>
-        <p:spPr/>
-        <p:txBody>
-          <a:bodyPr/>
-          <a:lstStyle/>
-          <a:p>
-            <a:fld id="{A47A8C64-5C8B-40B3-A683-36C8893A9F2F}" type="slidenum">
-              <a:rPr lang="he-IL" smtClean="0"/>
-              <a:t>40</a:t>
-            </a:fld>
-            <a:endParaRPr lang="he-IL"/>
-          </a:p>
-        </p:txBody>
-      </p:sp>
-    </p:spTree>
-    <p:extLst>
-      <p:ext uri="{BB962C8B-B14F-4D97-AF65-F5344CB8AC3E}">
-        <p14:creationId xmlns:p14="http://schemas.microsoft.com/office/powerpoint/2010/main" val="2274371036"/>
-      </p:ext>
-    </p:extLst>
-  </p:cSld>
-  <p:clrMapOvr>
-    <a:masterClrMapping/>
-  </p:clrMapOvr>
-</p:notes>
-</file>
-
-<file path=ppt/notesSlides/notesSlide12.xml><?xml version="1.0" encoding="utf-8"?>
-<p:notes xmlns:a="http://schemas.openxmlformats.org/drawingml/2006/main" xmlns:r="http://schemas.openxmlformats.org/officeDocument/2006/relationships" xmlns:p="http://schemas.openxmlformats.org/presentationml/2006/main">
-  <p:cSld>
-    <p:spTree>
-      <p:nvGrpSpPr>
-        <p:cNvPr id="1" name=""/>
-        <p:cNvGrpSpPr/>
-        <p:nvPr/>
-      </p:nvGrpSpPr>
-      <p:grpSpPr>
-        <a:xfrm>
-          <a:off x="0" y="0"/>
-          <a:ext cx="0" cy="0"/>
-          <a:chOff x="0" y="0"/>
-          <a:chExt cx="0" cy="0"/>
-        </a:xfrm>
-      </p:grpSpPr>
-      <p:sp>
-        <p:nvSpPr>
-          <p:cNvPr id="2" name="מציין מיקום של תמונת שקופית 1"/>
-          <p:cNvSpPr>
-            <a:spLocks noGrp="1" noRot="1" noChangeAspect="1"/>
-          </p:cNvSpPr>
-          <p:nvPr>
-            <p:ph type="sldImg"/>
-          </p:nvPr>
-        </p:nvSpPr>
-        <p:spPr/>
-      </p:sp>
-      <p:sp>
-        <p:nvSpPr>
-          <p:cNvPr id="3" name="מציין מיקום של הערות 2"/>
-          <p:cNvSpPr>
-            <a:spLocks noGrp="1"/>
-          </p:cNvSpPr>
-          <p:nvPr>
-            <p:ph type="body" idx="1"/>
-          </p:nvPr>
-        </p:nvSpPr>
-        <p:spPr/>
-        <p:txBody>
-          <a:bodyPr/>
-          <a:lstStyle/>
-          <a:p>
-            <a:pPr marL="0" marR="0" lvl="0" indent="0" algn="l" defTabSz="914400" rtl="1" eaLnBrk="1" fontAlgn="auto" latinLnBrk="0" hangingPunct="1">
-              <a:lnSpc>
-                <a:spcPct val="100000"/>
-              </a:lnSpc>
-              <a:spcBef>
-                <a:spcPts val="0"/>
-              </a:spcBef>
-              <a:spcAft>
-                <a:spcPts val="0"/>
-              </a:spcAft>
-              <a:buClrTx/>
-              <a:buSzTx/>
-              <a:buFontTx/>
-              <a:buNone/>
-              <a:tabLst/>
-              <a:defRPr/>
-            </a:pPr>
-            <a:r>
-              <a:rPr lang="en-US" dirty="0"/>
-              <a:t>As it can be seen from the attached figure, the “Do nothing” test indeed works. It compares at its first iteration the initial centroid values with the calculated ones and concludes the algorithm has converged.</a:t>
-            </a:r>
-          </a:p>
-          <a:p>
-            <a:pPr algn="l"/>
-            <a:endParaRPr lang="he-IL" dirty="0"/>
-          </a:p>
-        </p:txBody>
-      </p:sp>
-      <p:sp>
-        <p:nvSpPr>
-          <p:cNvPr id="4" name="מציין מיקום של מספר שקופית 3"/>
-          <p:cNvSpPr>
-            <a:spLocks noGrp="1"/>
-          </p:cNvSpPr>
-          <p:nvPr>
-            <p:ph type="sldNum" sz="quarter" idx="5"/>
-          </p:nvPr>
-        </p:nvSpPr>
-        <p:spPr/>
-        <p:txBody>
-          <a:bodyPr/>
-          <a:lstStyle/>
-          <a:p>
-            <a:fld id="{A47A8C64-5C8B-40B3-A683-36C8893A9F2F}" type="slidenum">
-              <a:rPr lang="he-IL" smtClean="0"/>
-              <a:t>41</a:t>
-            </a:fld>
-            <a:endParaRPr lang="he-IL"/>
-          </a:p>
-        </p:txBody>
-      </p:sp>
-    </p:spTree>
-    <p:extLst>
-      <p:ext uri="{BB962C8B-B14F-4D97-AF65-F5344CB8AC3E}">
-        <p14:creationId xmlns:p14="http://schemas.microsoft.com/office/powerpoint/2010/main" val="2373217856"/>
-      </p:ext>
-    </p:extLst>
-  </p:cSld>
-  <p:clrMapOvr>
-    <a:masterClrMapping/>
-  </p:clrMapOvr>
-</p:notes>
-</file>
-
-<file path=ppt/notesSlides/notesSlide13.xml><?xml version="1.0" encoding="utf-8"?>
-<p:notes xmlns:a="http://schemas.openxmlformats.org/drawingml/2006/main" xmlns:r="http://schemas.openxmlformats.org/officeDocument/2006/relationships" xmlns:p="http://schemas.openxmlformats.org/presentationml/2006/main">
-  <p:cSld>
-    <p:spTree>
-      <p:nvGrpSpPr>
-        <p:cNvPr id="1" name=""/>
-        <p:cNvGrpSpPr/>
-        <p:nvPr/>
-      </p:nvGrpSpPr>
-      <p:grpSpPr>
-        <a:xfrm>
-          <a:off x="0" y="0"/>
-          <a:ext cx="0" cy="0"/>
-          <a:chOff x="0" y="0"/>
-          <a:chExt cx="0" cy="0"/>
-        </a:xfrm>
-      </p:grpSpPr>
-      <p:sp>
-        <p:nvSpPr>
-          <p:cNvPr id="2" name="מציין מיקום של תמונת שקופית 1"/>
-          <p:cNvSpPr>
-            <a:spLocks noGrp="1" noRot="1" noChangeAspect="1"/>
-          </p:cNvSpPr>
-          <p:nvPr>
-            <p:ph type="sldImg"/>
-          </p:nvPr>
-        </p:nvSpPr>
-        <p:spPr/>
-      </p:sp>
-      <p:sp>
-        <p:nvSpPr>
-          <p:cNvPr id="3" name="מציין מיקום של הערות 2"/>
-          <p:cNvSpPr>
-            <a:spLocks noGrp="1"/>
-          </p:cNvSpPr>
-          <p:nvPr>
-            <p:ph type="body" idx="1"/>
-          </p:nvPr>
-        </p:nvSpPr>
-        <p:spPr/>
-        <p:txBody>
-          <a:bodyPr/>
-          <a:lstStyle/>
-          <a:p>
-            <a:pPr marL="0" marR="0" lvl="0" indent="0" algn="l" defTabSz="914400" rtl="1" eaLnBrk="1" fontAlgn="auto" latinLnBrk="0" hangingPunct="1">
-              <a:lnSpc>
-                <a:spcPct val="100000"/>
-              </a:lnSpc>
-              <a:spcBef>
-                <a:spcPts val="0"/>
-              </a:spcBef>
-              <a:spcAft>
-                <a:spcPts val="0"/>
-              </a:spcAft>
-              <a:buClrTx/>
-              <a:buSzTx/>
-              <a:buFontTx/>
-              <a:buNone/>
-              <a:tabLst/>
-              <a:defRPr/>
-            </a:pPr>
-            <a:r>
-              <a:rPr lang="en-US" dirty="0"/>
-              <a:t>In this section, a brief summary of this project is done and our conclusions exposed. This section will be divided into three. First, a summary about the innovations in our design compared to the design present in the paper this project was based on. Then, an analysis of the achieved performance of the IP and finally a section describing future improvements of the IP.</a:t>
-            </a:r>
-          </a:p>
-          <a:p>
-            <a:pPr algn="l"/>
-            <a:endParaRPr lang="he-IL" dirty="0"/>
-          </a:p>
-        </p:txBody>
-      </p:sp>
-      <p:sp>
-        <p:nvSpPr>
-          <p:cNvPr id="4" name="מציין מיקום של מספר שקופית 3"/>
-          <p:cNvSpPr>
-            <a:spLocks noGrp="1"/>
-          </p:cNvSpPr>
-          <p:nvPr>
-            <p:ph type="sldNum" sz="quarter" idx="5"/>
-          </p:nvPr>
-        </p:nvSpPr>
-        <p:spPr/>
-        <p:txBody>
-          <a:bodyPr/>
-          <a:lstStyle/>
-          <a:p>
-            <a:fld id="{A47A8C64-5C8B-40B3-A683-36C8893A9F2F}" type="slidenum">
-              <a:rPr lang="he-IL" smtClean="0"/>
-              <a:t>45</a:t>
-            </a:fld>
-            <a:endParaRPr lang="he-IL"/>
-          </a:p>
-        </p:txBody>
-      </p:sp>
-    </p:spTree>
-    <p:extLst>
-      <p:ext uri="{BB962C8B-B14F-4D97-AF65-F5344CB8AC3E}">
-        <p14:creationId xmlns:p14="http://schemas.microsoft.com/office/powerpoint/2010/main" val="1628832487"/>
-      </p:ext>
-    </p:extLst>
-  </p:cSld>
-  <p:clrMapOvr>
-    <a:masterClrMapping/>
-  </p:clrMapOvr>
-</p:notes>
-</file>
-
-<file path=ppt/notesSlides/notesSlide14.xml><?xml version="1.0" encoding="utf-8"?>
-<p:notes xmlns:a="http://schemas.openxmlformats.org/drawingml/2006/main" xmlns:r="http://schemas.openxmlformats.org/officeDocument/2006/relationships" xmlns:p="http://schemas.openxmlformats.org/presentationml/2006/main">
-  <p:cSld>
-    <p:spTree>
-      <p:nvGrpSpPr>
-        <p:cNvPr id="1" name=""/>
-        <p:cNvGrpSpPr/>
-        <p:nvPr/>
-      </p:nvGrpSpPr>
-      <p:grpSpPr>
-        <a:xfrm>
-          <a:off x="0" y="0"/>
-          <a:ext cx="0" cy="0"/>
-          <a:chOff x="0" y="0"/>
-          <a:chExt cx="0" cy="0"/>
-        </a:xfrm>
-      </p:grpSpPr>
-      <p:sp>
-        <p:nvSpPr>
-          <p:cNvPr id="2" name="מציין מיקום של תמונת שקופית 1"/>
-          <p:cNvSpPr>
-            <a:spLocks noGrp="1" noRot="1" noChangeAspect="1"/>
-          </p:cNvSpPr>
-          <p:nvPr>
-            <p:ph type="sldImg"/>
-          </p:nvPr>
-        </p:nvSpPr>
-        <p:spPr/>
-      </p:sp>
-      <p:sp>
-        <p:nvSpPr>
-          <p:cNvPr id="3" name="מציין מיקום של הערות 2"/>
-          <p:cNvSpPr>
-            <a:spLocks noGrp="1"/>
-          </p:cNvSpPr>
-          <p:nvPr>
-            <p:ph type="body" idx="1"/>
-          </p:nvPr>
-        </p:nvSpPr>
-        <p:spPr/>
-        <p:txBody>
-          <a:bodyPr/>
-          <a:lstStyle/>
-          <a:p>
-            <a:pPr algn="l"/>
-            <a:r>
-              <a:rPr lang="en-US" dirty="0"/>
-              <a:t> One main different are the units used for the architecture – the proposed paper has a specific RAM and DIV units. Due to academical limits – there was a choice for a DIV that will provide performance despite this limitation – for more refer to section ‎2.6.2.3.</a:t>
-            </a:r>
-          </a:p>
-          <a:p>
-            <a:pPr algn="l"/>
-            <a:r>
-              <a:rPr lang="en-US" dirty="0"/>
-              <a:t>Another difference is the interface description. Although the paper proposes an IP architecture, it does not explicit explain the interface specifications, therefore not being clear how the IP could be integrated with a CPU. In our design, there is a clear interface description as described in section ‎2.5. Because of its simplicity and wide use in the industry, we choose to use APB communication protocol (as presented in chapter 1 - where the CPU should be the master and the K means IP is the slave) as our interface protocol. </a:t>
-            </a:r>
-          </a:p>
-          <a:p>
-            <a:pPr algn="l"/>
-            <a:r>
-              <a:rPr lang="en-US" dirty="0"/>
-              <a:t>The last main difference we would like to mention is the micro architecture implementation extension. Even though the paper presents a k means-core architecture, it does not extend on the low level implementation. In our project, micro architecture, down to private implementation, was extended.</a:t>
-            </a:r>
-          </a:p>
-          <a:p>
-            <a:pPr algn="l"/>
-            <a:endParaRPr lang="en-US" dirty="0"/>
-          </a:p>
-          <a:p>
-            <a:pPr algn="l"/>
-            <a:endParaRPr lang="he-IL" dirty="0"/>
-          </a:p>
-        </p:txBody>
-      </p:sp>
-      <p:sp>
-        <p:nvSpPr>
-          <p:cNvPr id="4" name="מציין מיקום של מספר שקופית 3"/>
-          <p:cNvSpPr>
-            <a:spLocks noGrp="1"/>
-          </p:cNvSpPr>
-          <p:nvPr>
-            <p:ph type="sldNum" sz="quarter" idx="5"/>
-          </p:nvPr>
-        </p:nvSpPr>
-        <p:spPr/>
-        <p:txBody>
-          <a:bodyPr/>
-          <a:lstStyle/>
-          <a:p>
-            <a:fld id="{A47A8C64-5C8B-40B3-A683-36C8893A9F2F}" type="slidenum">
-              <a:rPr lang="he-IL" smtClean="0"/>
-              <a:t>46</a:t>
-            </a:fld>
-            <a:endParaRPr lang="he-IL"/>
-          </a:p>
-        </p:txBody>
-      </p:sp>
-    </p:spTree>
-    <p:extLst>
-      <p:ext uri="{BB962C8B-B14F-4D97-AF65-F5344CB8AC3E}">
-        <p14:creationId xmlns:p14="http://schemas.microsoft.com/office/powerpoint/2010/main" val="627816801"/>
-      </p:ext>
-    </p:extLst>
-  </p:cSld>
-  <p:clrMapOvr>
-    <a:masterClrMapping/>
-  </p:clrMapOvr>
-</p:notes>
-</file>
-
-<file path=ppt/notesSlides/notesSlide15.xml><?xml version="1.0" encoding="utf-8"?>
-<p:notes xmlns:a="http://schemas.openxmlformats.org/drawingml/2006/main" xmlns:r="http://schemas.openxmlformats.org/officeDocument/2006/relationships" xmlns:p="http://schemas.openxmlformats.org/presentationml/2006/main">
-  <p:cSld>
-    <p:spTree>
-      <p:nvGrpSpPr>
-        <p:cNvPr id="1" name=""/>
-        <p:cNvGrpSpPr/>
-        <p:nvPr/>
-      </p:nvGrpSpPr>
-      <p:grpSpPr>
-        <a:xfrm>
-          <a:off x="0" y="0"/>
-          <a:ext cx="0" cy="0"/>
-          <a:chOff x="0" y="0"/>
-          <a:chExt cx="0" cy="0"/>
-        </a:xfrm>
-      </p:grpSpPr>
-      <p:sp>
-        <p:nvSpPr>
-          <p:cNvPr id="2" name="מציין מיקום של תמונת שקופית 1"/>
-          <p:cNvSpPr>
-            <a:spLocks noGrp="1" noRot="1" noChangeAspect="1"/>
-          </p:cNvSpPr>
-          <p:nvPr>
-            <p:ph type="sldImg"/>
-          </p:nvPr>
-        </p:nvSpPr>
-        <p:spPr/>
-      </p:sp>
-      <p:sp>
-        <p:nvSpPr>
-          <p:cNvPr id="3" name="מציין מיקום של הערות 2"/>
-          <p:cNvSpPr>
-            <a:spLocks noGrp="1"/>
-          </p:cNvSpPr>
-          <p:nvPr>
-            <p:ph type="body" idx="1"/>
-          </p:nvPr>
-        </p:nvSpPr>
-        <p:spPr/>
-        <p:txBody>
-          <a:bodyPr/>
-          <a:lstStyle/>
-          <a:p>
-            <a:pPr algn="l"/>
-            <a:r>
-              <a:rPr lang="en-US" dirty="0"/>
-              <a:t>The total running time of the algorithm in our IP for the example described in section ‎4.2.1 was of 167*10^7 [</a:t>
-            </a:r>
-            <a:r>
-              <a:rPr lang="en-US" dirty="0" err="1"/>
-              <a:t>fsec</a:t>
-            </a:r>
-            <a:r>
-              <a:rPr lang="en-US" dirty="0"/>
-              <a:t>]=1.67 [</a:t>
-            </a:r>
-            <a:r>
-              <a:rPr lang="en-US" dirty="0" err="1"/>
-              <a:t>μsec</a:t>
-            </a:r>
-            <a:r>
-              <a:rPr lang="en-US" dirty="0"/>
-              <a:t>] for a simulation done with clock cycle set at 10 [</a:t>
-            </a:r>
-            <a:r>
-              <a:rPr lang="en-US" dirty="0" err="1"/>
-              <a:t>nsec</a:t>
-            </a:r>
-            <a:r>
-              <a:rPr lang="en-US" dirty="0"/>
-              <a:t>]. Duo to the fact that in our Synthesis process we set the clock cycle to be 7.5[</a:t>
-            </a:r>
-            <a:r>
-              <a:rPr lang="en-US" dirty="0" err="1"/>
-              <a:t>nsec</a:t>
-            </a:r>
-            <a:r>
-              <a:rPr lang="en-US" dirty="0"/>
-              <a:t>], the actual running time of the K means IP for the example described in section ‎4.2.1 was would be a total of 1.2525[</a:t>
-            </a:r>
-            <a:r>
-              <a:rPr lang="en-US" dirty="0" err="1"/>
-              <a:t>μsec</a:t>
-            </a:r>
-            <a:r>
-              <a:rPr lang="en-US" dirty="0"/>
-              <a:t>] .</a:t>
-            </a:r>
-          </a:p>
-          <a:p>
-            <a:pPr algn="l"/>
-            <a:r>
-              <a:rPr lang="en-US" dirty="0"/>
-              <a:t>In the other hand, the </a:t>
-            </a:r>
-            <a:r>
-              <a:rPr lang="en-US" dirty="0" err="1"/>
-              <a:t>Matlab</a:t>
-            </a:r>
-            <a:r>
-              <a:rPr lang="en-US" dirty="0"/>
-              <a:t> script used to verified the correctness of the output for input example described in section ‎4.2.1 took approximately 1.68 [sec], meaning the speedup for the algorithm using the IP was of 1.34*10^6. </a:t>
-            </a:r>
-          </a:p>
-          <a:p>
-            <a:pPr algn="l"/>
-            <a:endParaRPr lang="he-IL" dirty="0"/>
-          </a:p>
-        </p:txBody>
-      </p:sp>
-      <p:sp>
-        <p:nvSpPr>
-          <p:cNvPr id="4" name="מציין מיקום של מספר שקופית 3"/>
-          <p:cNvSpPr>
-            <a:spLocks noGrp="1"/>
-          </p:cNvSpPr>
-          <p:nvPr>
-            <p:ph type="sldNum" sz="quarter" idx="5"/>
-          </p:nvPr>
-        </p:nvSpPr>
-        <p:spPr/>
-        <p:txBody>
-          <a:bodyPr/>
-          <a:lstStyle/>
-          <a:p>
-            <a:fld id="{A47A8C64-5C8B-40B3-A683-36C8893A9F2F}" type="slidenum">
-              <a:rPr lang="he-IL" smtClean="0"/>
-              <a:t>47</a:t>
-            </a:fld>
-            <a:endParaRPr lang="he-IL"/>
-          </a:p>
-        </p:txBody>
-      </p:sp>
-    </p:spTree>
-    <p:extLst>
-      <p:ext uri="{BB962C8B-B14F-4D97-AF65-F5344CB8AC3E}">
-        <p14:creationId xmlns:p14="http://schemas.microsoft.com/office/powerpoint/2010/main" val="1115077963"/>
-      </p:ext>
-    </p:extLst>
-  </p:cSld>
-  <p:clrMapOvr>
-    <a:masterClrMapping/>
-  </p:clrMapOvr>
-</p:notes>
-</file>
-
-<file path=ppt/notesSlides/notesSlide16.xml><?xml version="1.0" encoding="utf-8"?>
-<p:notes xmlns:a="http://schemas.openxmlformats.org/drawingml/2006/main" xmlns:r="http://schemas.openxmlformats.org/officeDocument/2006/relationships" xmlns:p="http://schemas.openxmlformats.org/presentationml/2006/main">
-  <p:cSld>
-    <p:spTree>
-      <p:nvGrpSpPr>
-        <p:cNvPr id="1" name=""/>
-        <p:cNvGrpSpPr/>
-        <p:nvPr/>
-      </p:nvGrpSpPr>
-      <p:grpSpPr>
-        <a:xfrm>
-          <a:off x="0" y="0"/>
-          <a:ext cx="0" cy="0"/>
-          <a:chOff x="0" y="0"/>
-          <a:chExt cx="0" cy="0"/>
-        </a:xfrm>
-      </p:grpSpPr>
-      <p:sp>
-        <p:nvSpPr>
-          <p:cNvPr id="2" name="מציין מיקום של תמונת שקופית 1"/>
-          <p:cNvSpPr>
-            <a:spLocks noGrp="1" noRot="1" noChangeAspect="1"/>
-          </p:cNvSpPr>
-          <p:nvPr>
-            <p:ph type="sldImg"/>
-          </p:nvPr>
-        </p:nvSpPr>
-        <p:spPr/>
-      </p:sp>
-      <p:sp>
-        <p:nvSpPr>
-          <p:cNvPr id="3" name="מציין מיקום של הערות 2"/>
-          <p:cNvSpPr>
-            <a:spLocks noGrp="1"/>
-          </p:cNvSpPr>
-          <p:nvPr>
-            <p:ph type="body" idx="1"/>
-          </p:nvPr>
-        </p:nvSpPr>
-        <p:spPr/>
-        <p:txBody>
-          <a:bodyPr/>
-          <a:lstStyle/>
-          <a:p>
-            <a:pPr marL="0" indent="0" algn="l">
-              <a:buNone/>
-            </a:pPr>
-            <a:r>
-              <a:rPr lang="en-US" dirty="0"/>
-              <a:t>• The use of large dividers affects not only the total area size, but also it sets the critical path. A way of solving (even if partially) this problem could be using smaller dividers, at the cost of the calculation accuracy. Future analysis could be done to the better describe the tradeoff between calculation accuracy and time and area constrains and choose the optimal DIVIDERS size.</a:t>
-            </a:r>
-          </a:p>
-          <a:p>
-            <a:pPr marL="0" indent="0" algn="l">
-              <a:buNone/>
-            </a:pPr>
-            <a:r>
-              <a:rPr lang="en-US" dirty="0"/>
-              <a:t>• In our design, the number of clusters was predetermined to be eight. For future improvement, the code could be changed to allow the user to choose how many clusters to use in the algorithm.</a:t>
-            </a:r>
-          </a:p>
-          <a:p>
-            <a:pPr marL="0" indent="0" algn="l">
-              <a:buNone/>
-            </a:pPr>
-            <a:r>
-              <a:rPr lang="en-US" dirty="0"/>
-              <a:t>• In our design, the input data size and dimensions were predetermined. For future improvement, the code could be changed to allow the user to choose the input data size and dimensions of the algorithm.</a:t>
-            </a:r>
-          </a:p>
-          <a:p>
-            <a:pPr marL="0" indent="0" algn="l">
-              <a:buNone/>
-            </a:pPr>
-            <a:r>
-              <a:rPr lang="en-US" dirty="0"/>
-              <a:t>• A maximum iterations feature could be added to the design. As it is not certain the number of iterations it will take for the algorithm to reach convergence, a future register could be added enabling the user to set maximum number of iterations wanted to be ran, ending the algorithm after this predetermined number of iterations whether convergence has been achieved or not.</a:t>
-            </a:r>
-          </a:p>
-          <a:p>
-            <a:pPr marL="0" indent="0" algn="l">
-              <a:buNone/>
-            </a:pPr>
-            <a:r>
-              <a:rPr lang="en-US" dirty="0"/>
-              <a:t>• Duo to the chosen architecture of two data dependent pipelines which run in series, the clock domain could be improved by having one clock for each pipeline. In this manner, at least one of the pipelines (the slower one between the two) could have better performance, improving the overall performance. This could possible be done also for the Register File, allowing the APB communications to be faster and therefore improving even more the total performance.</a:t>
-            </a:r>
-          </a:p>
-          <a:p>
-            <a:pPr algn="l"/>
-            <a:endParaRPr lang="en-US" dirty="0"/>
-          </a:p>
-          <a:p>
-            <a:pPr algn="l"/>
-            <a:endParaRPr lang="he-IL" dirty="0"/>
-          </a:p>
-        </p:txBody>
-      </p:sp>
-      <p:sp>
-        <p:nvSpPr>
-          <p:cNvPr id="4" name="מציין מיקום של מספר שקופית 3"/>
-          <p:cNvSpPr>
-            <a:spLocks noGrp="1"/>
-          </p:cNvSpPr>
-          <p:nvPr>
-            <p:ph type="sldNum" sz="quarter" idx="5"/>
-          </p:nvPr>
-        </p:nvSpPr>
-        <p:spPr/>
-        <p:txBody>
-          <a:bodyPr/>
-          <a:lstStyle/>
-          <a:p>
-            <a:fld id="{A47A8C64-5C8B-40B3-A683-36C8893A9F2F}" type="slidenum">
-              <a:rPr lang="he-IL" smtClean="0"/>
-              <a:t>48</a:t>
-            </a:fld>
-            <a:endParaRPr lang="he-IL"/>
-          </a:p>
-        </p:txBody>
-      </p:sp>
-    </p:spTree>
-    <p:extLst>
-      <p:ext uri="{BB962C8B-B14F-4D97-AF65-F5344CB8AC3E}">
-        <p14:creationId xmlns:p14="http://schemas.microsoft.com/office/powerpoint/2010/main" val="3578121929"/>
-      </p:ext>
-    </p:extLst>
-  </p:cSld>
-  <p:clrMapOvr>
-    <a:masterClrMapping/>
-  </p:clrMapOvr>
-</p:notes>
-</file>
-
-<file path=ppt/notesSlides/notesSlide17.xml><?xml version="1.0" encoding="utf-8"?>
-<p:notes xmlns:a="http://schemas.openxmlformats.org/drawingml/2006/main" xmlns:r="http://schemas.openxmlformats.org/officeDocument/2006/relationships" xmlns:p="http://schemas.openxmlformats.org/presentationml/2006/main">
-  <p:cSld>
-    <p:spTree>
-      <p:nvGrpSpPr>
-        <p:cNvPr id="1" name=""/>
-        <p:cNvGrpSpPr/>
-        <p:nvPr/>
-      </p:nvGrpSpPr>
-      <p:grpSpPr>
-        <a:xfrm>
-          <a:off x="0" y="0"/>
-          <a:ext cx="0" cy="0"/>
-          <a:chOff x="0" y="0"/>
-          <a:chExt cx="0" cy="0"/>
-        </a:xfrm>
-      </p:grpSpPr>
-      <p:sp>
-        <p:nvSpPr>
-          <p:cNvPr id="2" name="מציין מיקום של תמונת שקופית 1"/>
-          <p:cNvSpPr>
-            <a:spLocks noGrp="1" noRot="1" noChangeAspect="1"/>
-          </p:cNvSpPr>
-          <p:nvPr>
-            <p:ph type="sldImg"/>
-          </p:nvPr>
-        </p:nvSpPr>
-        <p:spPr/>
-      </p:sp>
-      <p:sp>
-        <p:nvSpPr>
-          <p:cNvPr id="3" name="מציין מיקום של הערות 2"/>
-          <p:cNvSpPr>
-            <a:spLocks noGrp="1"/>
-          </p:cNvSpPr>
-          <p:nvPr>
-            <p:ph type="body" idx="1"/>
-          </p:nvPr>
-        </p:nvSpPr>
-        <p:spPr/>
-        <p:txBody>
-          <a:bodyPr/>
-          <a:lstStyle/>
-          <a:p>
-            <a:pPr marL="0" indent="0" algn="l">
-              <a:buNone/>
-            </a:pPr>
-            <a:r>
-              <a:rPr lang="en-US" dirty="0"/>
-              <a:t>• The use of large dividers affects not only the total area size, but also it sets the critical path. A way of solving (even if partially) this problem could be using smaller dividers, at the cost of the calculation accuracy. Future analysis could be done to the better describe the tradeoff between calculation accuracy and time and area constrains and choose the optimal DIVIDERS size.</a:t>
-            </a:r>
-          </a:p>
-          <a:p>
-            <a:pPr marL="0" indent="0" algn="l">
-              <a:buNone/>
-            </a:pPr>
-            <a:r>
-              <a:rPr lang="en-US" dirty="0"/>
-              <a:t>• In our design, the number of clusters was predetermined to be eight. For future improvement, the code could be changed to allow the user to choose how many clusters to use in the algorithm.</a:t>
-            </a:r>
-          </a:p>
-          <a:p>
-            <a:pPr marL="0" indent="0" algn="l">
-              <a:buNone/>
-            </a:pPr>
-            <a:r>
-              <a:rPr lang="en-US" dirty="0"/>
-              <a:t>• In our design, the input data size and dimensions were predetermined. For future improvement, the code could be changed to allow the user to choose the input data size and dimensions of the algorithm.</a:t>
-            </a:r>
-          </a:p>
-          <a:p>
-            <a:pPr marL="0" indent="0" algn="l">
-              <a:buNone/>
-            </a:pPr>
-            <a:r>
-              <a:rPr lang="en-US" dirty="0"/>
-              <a:t>• A maximum iterations feature could be added to the design. As it is not certain the number of iterations it will take for the algorithm to reach convergence, a future register could be added enabling the user to set maximum number of iterations wanted to be ran, ending the algorithm after this predetermined number of iterations whether convergence has been achieved or not.</a:t>
-            </a:r>
-          </a:p>
-          <a:p>
-            <a:pPr marL="0" indent="0" algn="l">
-              <a:buNone/>
-            </a:pPr>
-            <a:r>
-              <a:rPr lang="en-US" dirty="0"/>
-              <a:t>• Duo to the chosen architecture of two data dependent pipelines which run in series, the clock domain could be improved by having one clock for each pipeline. In this manner, at least one of the pipelines (the slower one between the two) could have better performance, improving the overall performance. This could possible be done also for the Register File, allowing the APB communications to be faster and therefore improving even more the total performance.</a:t>
-            </a:r>
-          </a:p>
-          <a:p>
-            <a:pPr algn="l"/>
-            <a:endParaRPr lang="en-US" dirty="0"/>
-          </a:p>
-          <a:p>
-            <a:pPr algn="l"/>
-            <a:endParaRPr lang="he-IL" dirty="0"/>
-          </a:p>
-        </p:txBody>
-      </p:sp>
-      <p:sp>
-        <p:nvSpPr>
-          <p:cNvPr id="4" name="מציין מיקום של מספר שקופית 3"/>
-          <p:cNvSpPr>
-            <a:spLocks noGrp="1"/>
-          </p:cNvSpPr>
-          <p:nvPr>
-            <p:ph type="sldNum" sz="quarter" idx="5"/>
-          </p:nvPr>
-        </p:nvSpPr>
-        <p:spPr/>
-        <p:txBody>
-          <a:bodyPr/>
-          <a:lstStyle/>
-          <a:p>
-            <a:fld id="{A47A8C64-5C8B-40B3-A683-36C8893A9F2F}" type="slidenum">
-              <a:rPr lang="he-IL" smtClean="0"/>
-              <a:t>49</a:t>
-            </a:fld>
-            <a:endParaRPr lang="he-IL"/>
-          </a:p>
-        </p:txBody>
-      </p:sp>
-    </p:spTree>
-    <p:extLst>
-      <p:ext uri="{BB962C8B-B14F-4D97-AF65-F5344CB8AC3E}">
-        <p14:creationId xmlns:p14="http://schemas.microsoft.com/office/powerpoint/2010/main" val="1232629357"/>
-      </p:ext>
-    </p:extLst>
-  </p:cSld>
-  <p:clrMapOvr>
-    <a:masterClrMapping/>
-  </p:clrMapOvr>
-</p:notes>
-</file>
-
-<file path=ppt/notesSlides/notesSlide2.xml><?xml version="1.0" encoding="utf-8"?>
-<p:notes xmlns:a="http://schemas.openxmlformats.org/drawingml/2006/main" xmlns:r="http://schemas.openxmlformats.org/officeDocument/2006/relationships" xmlns:p="http://schemas.openxmlformats.org/presentationml/2006/main">
-  <p:cSld>
-    <p:spTree>
-      <p:nvGrpSpPr>
-        <p:cNvPr id="1" name=""/>
-        <p:cNvGrpSpPr/>
-        <p:nvPr/>
-      </p:nvGrpSpPr>
-      <p:grpSpPr>
-        <a:xfrm>
-          <a:off x="0" y="0"/>
-          <a:ext cx="0" cy="0"/>
-          <a:chOff x="0" y="0"/>
-          <a:chExt cx="0" cy="0"/>
-        </a:xfrm>
-      </p:grpSpPr>
-      <p:sp>
-        <p:nvSpPr>
-          <p:cNvPr id="2" name="מציין מיקום של תמונת שקופית 1"/>
-          <p:cNvSpPr>
-            <a:spLocks noGrp="1" noRot="1" noChangeAspect="1"/>
-          </p:cNvSpPr>
-          <p:nvPr>
-            <p:ph type="sldImg"/>
-          </p:nvPr>
-        </p:nvSpPr>
-        <p:spPr/>
-      </p:sp>
-      <p:sp>
-        <p:nvSpPr>
-          <p:cNvPr id="3" name="מציין מיקום של הערות 2"/>
-          <p:cNvSpPr>
-            <a:spLocks noGrp="1"/>
-          </p:cNvSpPr>
-          <p:nvPr>
-            <p:ph type="body" idx="1"/>
-          </p:nvPr>
-        </p:nvSpPr>
-        <p:spPr/>
-        <p:txBody>
-          <a:bodyPr/>
-          <a:lstStyle/>
-          <a:p>
-            <a:pPr marL="0" marR="0" lvl="0" indent="0" algn="l" defTabSz="914400" rtl="1" eaLnBrk="1" fontAlgn="auto" latinLnBrk="0" hangingPunct="1">
-              <a:lnSpc>
-                <a:spcPct val="100000"/>
-              </a:lnSpc>
-              <a:spcBef>
-                <a:spcPts val="0"/>
-              </a:spcBef>
-              <a:spcAft>
-                <a:spcPts val="0"/>
-              </a:spcAft>
-              <a:buClrTx/>
-              <a:buSzTx/>
-              <a:buFontTx/>
-              <a:buNone/>
-              <a:tabLst/>
-              <a:defRPr/>
-            </a:pPr>
-            <a:r>
-              <a:rPr lang="en-US" dirty="0"/>
-              <a:t>The distance calculation from the input data point (stored in the “Input register”) to the centroids, which are stored in local registers called “Centroid Register X” (X being a integer from 1 to 8). This calculation is done by o module called “Distance calculator” which is basically  two sub modules in series: the first calculates the subtraction of the data in the input register from the data in centroid register “X”, the second is a module which calculates the absolute value of the mentioned  subtraction. </a:t>
-            </a:r>
-          </a:p>
-          <a:p>
-            <a:pPr algn="l"/>
-            <a:endParaRPr lang="he-IL" dirty="0"/>
-          </a:p>
-        </p:txBody>
-      </p:sp>
-      <p:sp>
-        <p:nvSpPr>
-          <p:cNvPr id="4" name="מציין מיקום של מספר שקופית 3"/>
-          <p:cNvSpPr>
-            <a:spLocks noGrp="1"/>
-          </p:cNvSpPr>
-          <p:nvPr>
-            <p:ph type="sldNum" sz="quarter" idx="5"/>
-          </p:nvPr>
-        </p:nvSpPr>
-        <p:spPr/>
-        <p:txBody>
-          <a:bodyPr/>
-          <a:lstStyle/>
-          <a:p>
-            <a:fld id="{A47A8C64-5C8B-40B3-A683-36C8893A9F2F}" type="slidenum">
-              <a:rPr lang="he-IL" smtClean="0"/>
-              <a:t>22</a:t>
-            </a:fld>
-            <a:endParaRPr lang="he-IL"/>
-          </a:p>
-        </p:txBody>
-      </p:sp>
-    </p:spTree>
-    <p:extLst>
-      <p:ext uri="{BB962C8B-B14F-4D97-AF65-F5344CB8AC3E}">
-        <p14:creationId xmlns:p14="http://schemas.microsoft.com/office/powerpoint/2010/main" val="3899350229"/>
-      </p:ext>
-    </p:extLst>
-  </p:cSld>
-  <p:clrMapOvr>
-    <a:masterClrMapping/>
-  </p:clrMapOvr>
-</p:notes>
-</file>
-
-<file path=ppt/notesSlides/notesSlide3.xml><?xml version="1.0" encoding="utf-8"?>
-<p:notes xmlns:a="http://schemas.openxmlformats.org/drawingml/2006/main" xmlns:r="http://schemas.openxmlformats.org/officeDocument/2006/relationships" xmlns:p="http://schemas.openxmlformats.org/presentationml/2006/main">
-  <p:cSld>
-    <p:spTree>
-      <p:nvGrpSpPr>
-        <p:cNvPr id="1" name=""/>
-        <p:cNvGrpSpPr/>
-        <p:nvPr/>
-      </p:nvGrpSpPr>
-      <p:grpSpPr>
-        <a:xfrm>
-          <a:off x="0" y="0"/>
-          <a:ext cx="0" cy="0"/>
-          <a:chOff x="0" y="0"/>
-          <a:chExt cx="0" cy="0"/>
-        </a:xfrm>
-      </p:grpSpPr>
-      <p:sp>
-        <p:nvSpPr>
-          <p:cNvPr id="2" name="מציין מיקום של תמונת שקופית 1"/>
-          <p:cNvSpPr>
-            <a:spLocks noGrp="1" noRot="1" noChangeAspect="1"/>
-          </p:cNvSpPr>
-          <p:nvPr>
-            <p:ph type="sldImg"/>
-          </p:nvPr>
-        </p:nvSpPr>
-        <p:spPr/>
-      </p:sp>
-      <p:sp>
-        <p:nvSpPr>
-          <p:cNvPr id="3" name="מציין מיקום של הערות 2"/>
-          <p:cNvSpPr>
-            <a:spLocks noGrp="1"/>
-          </p:cNvSpPr>
-          <p:nvPr>
-            <p:ph type="body" idx="1"/>
-          </p:nvPr>
-        </p:nvSpPr>
-        <p:spPr/>
-        <p:txBody>
-          <a:bodyPr/>
-          <a:lstStyle/>
-          <a:p>
-            <a:pPr algn="l"/>
-            <a:r>
-              <a:rPr lang="en-US" dirty="0"/>
-              <a:t>distance calculation </a:t>
-            </a:r>
-            <a:endParaRPr lang="he-IL" dirty="0"/>
-          </a:p>
-        </p:txBody>
-      </p:sp>
-      <p:sp>
-        <p:nvSpPr>
-          <p:cNvPr id="4" name="מציין מיקום של מספר שקופית 3"/>
-          <p:cNvSpPr>
-            <a:spLocks noGrp="1"/>
-          </p:cNvSpPr>
-          <p:nvPr>
-            <p:ph type="sldNum" sz="quarter" idx="5"/>
-          </p:nvPr>
-        </p:nvSpPr>
-        <p:spPr/>
-        <p:txBody>
-          <a:bodyPr/>
-          <a:lstStyle/>
-          <a:p>
-            <a:fld id="{A47A8C64-5C8B-40B3-A683-36C8893A9F2F}" type="slidenum">
-              <a:rPr lang="he-IL" smtClean="0"/>
-              <a:t>23</a:t>
-            </a:fld>
-            <a:endParaRPr lang="he-IL"/>
-          </a:p>
-        </p:txBody>
-      </p:sp>
-    </p:spTree>
-    <p:extLst>
-      <p:ext uri="{BB962C8B-B14F-4D97-AF65-F5344CB8AC3E}">
-        <p14:creationId xmlns:p14="http://schemas.microsoft.com/office/powerpoint/2010/main" val="4182274364"/>
-      </p:ext>
-    </p:extLst>
-  </p:cSld>
-  <p:clrMapOvr>
-    <a:masterClrMapping/>
-  </p:clrMapOvr>
-</p:notes>
-</file>
-
-<file path=ppt/notesSlides/notesSlide4.xml><?xml version="1.0" encoding="utf-8"?>
-<p:notes xmlns:a="http://schemas.openxmlformats.org/drawingml/2006/main" xmlns:r="http://schemas.openxmlformats.org/officeDocument/2006/relationships" xmlns:p="http://schemas.openxmlformats.org/presentationml/2006/main">
-  <p:cSld>
-    <p:spTree>
-      <p:nvGrpSpPr>
-        <p:cNvPr id="1" name=""/>
-        <p:cNvGrpSpPr/>
-        <p:nvPr/>
-      </p:nvGrpSpPr>
-      <p:grpSpPr>
-        <a:xfrm>
-          <a:off x="0" y="0"/>
-          <a:ext cx="0" cy="0"/>
-          <a:chOff x="0" y="0"/>
-          <a:chExt cx="0" cy="0"/>
-        </a:xfrm>
-      </p:grpSpPr>
-      <p:sp>
-        <p:nvSpPr>
-          <p:cNvPr id="2" name="מציין מיקום של תמונת שקופית 1"/>
-          <p:cNvSpPr>
-            <a:spLocks noGrp="1" noRot="1" noChangeAspect="1"/>
-          </p:cNvSpPr>
-          <p:nvPr>
-            <p:ph type="sldImg"/>
-          </p:nvPr>
-        </p:nvSpPr>
-        <p:spPr/>
-      </p:sp>
-      <p:sp>
-        <p:nvSpPr>
-          <p:cNvPr id="3" name="מציין מיקום של הערות 2"/>
-          <p:cNvSpPr>
-            <a:spLocks noGrp="1"/>
-          </p:cNvSpPr>
-          <p:nvPr>
-            <p:ph type="body" idx="1"/>
-          </p:nvPr>
-        </p:nvSpPr>
-        <p:spPr/>
-        <p:txBody>
-          <a:bodyPr/>
-          <a:lstStyle/>
-          <a:p>
-            <a:pPr marL="0" marR="0" lvl="0" indent="0" algn="l" defTabSz="914400" rtl="1" eaLnBrk="1" fontAlgn="auto" latinLnBrk="0" hangingPunct="1">
-              <a:lnSpc>
-                <a:spcPct val="100000"/>
-              </a:lnSpc>
-              <a:spcBef>
-                <a:spcPts val="0"/>
-              </a:spcBef>
-              <a:spcAft>
-                <a:spcPts val="0"/>
-              </a:spcAft>
-              <a:buClrTx/>
-              <a:buSzTx/>
-              <a:buFontTx/>
-              <a:buNone/>
-              <a:tabLst/>
-              <a:defRPr/>
-            </a:pPr>
-            <a:r>
-              <a:rPr lang="en-US" dirty="0"/>
-              <a:t>The component consist sixteen registers: eight accumulators registers and eight counters registers.</a:t>
-            </a:r>
-          </a:p>
-          <a:p>
-            <a:pPr marL="0" marR="0" lvl="0" indent="0" algn="l" defTabSz="914400" rtl="1" eaLnBrk="1" fontAlgn="auto" latinLnBrk="0" hangingPunct="1">
-              <a:lnSpc>
-                <a:spcPct val="100000"/>
-              </a:lnSpc>
-              <a:spcBef>
-                <a:spcPts val="0"/>
-              </a:spcBef>
-              <a:spcAft>
-                <a:spcPts val="0"/>
-              </a:spcAft>
-              <a:buClrTx/>
-              <a:buSzTx/>
-              <a:buFontTx/>
-              <a:buNone/>
-              <a:tabLst/>
-              <a:defRPr/>
-            </a:pPr>
-            <a:endParaRPr lang="he-IL" dirty="0"/>
-          </a:p>
-          <a:p>
-            <a:pPr marL="0" marR="0" lvl="0" indent="0" algn="l" defTabSz="914400" rtl="1" eaLnBrk="1" fontAlgn="auto" latinLnBrk="0" hangingPunct="1">
-              <a:lnSpc>
-                <a:spcPct val="100000"/>
-              </a:lnSpc>
-              <a:spcBef>
-                <a:spcPts val="0"/>
-              </a:spcBef>
-              <a:spcAft>
-                <a:spcPts val="0"/>
-              </a:spcAft>
-              <a:buClrTx/>
-              <a:buSzTx/>
-              <a:buFontTx/>
-              <a:buNone/>
-              <a:tabLst/>
-              <a:defRPr/>
-            </a:pPr>
-            <a:r>
-              <a:rPr lang="en-US" dirty="0"/>
-              <a:t>Each accumulator represents a cluster and stores the summed of all points assign to this cluster at a given time. The counters are register which simply keep track of how many points were assigned to each </a:t>
-            </a:r>
-            <a:r>
-              <a:rPr lang="en-US" dirty="0" err="1"/>
-              <a:t>cluste</a:t>
-            </a:r>
-            <a:r>
-              <a:rPr lang="en-US" dirty="0"/>
-              <a:t>	The index received from the previous part is used as a selector for two decoders, in order to choose to each accumulator, register and counter register the input data point should be added. </a:t>
-            </a:r>
-            <a:endParaRPr lang="he-IL" dirty="0"/>
-          </a:p>
-        </p:txBody>
-      </p:sp>
-      <p:sp>
-        <p:nvSpPr>
-          <p:cNvPr id="4" name="מציין מיקום של מספר שקופית 3"/>
-          <p:cNvSpPr>
-            <a:spLocks noGrp="1"/>
-          </p:cNvSpPr>
-          <p:nvPr>
-            <p:ph type="sldNum" sz="quarter" idx="5"/>
-          </p:nvPr>
-        </p:nvSpPr>
-        <p:spPr/>
-        <p:txBody>
-          <a:bodyPr/>
-          <a:lstStyle/>
-          <a:p>
-            <a:fld id="{A47A8C64-5C8B-40B3-A683-36C8893A9F2F}" type="slidenum">
-              <a:rPr lang="he-IL" smtClean="0"/>
-              <a:t>24</a:t>
-            </a:fld>
-            <a:endParaRPr lang="he-IL"/>
-          </a:p>
-        </p:txBody>
-      </p:sp>
-    </p:spTree>
-    <p:extLst>
-      <p:ext uri="{BB962C8B-B14F-4D97-AF65-F5344CB8AC3E}">
-        <p14:creationId xmlns:p14="http://schemas.microsoft.com/office/powerpoint/2010/main" val="1970069588"/>
-      </p:ext>
-    </p:extLst>
-  </p:cSld>
-  <p:clrMapOvr>
-    <a:masterClrMapping/>
-  </p:clrMapOvr>
-</p:notes>
-</file>
-
-<file path=ppt/notesSlides/notesSlide5.xml><?xml version="1.0" encoding="utf-8"?>
-<p:notes xmlns:a="http://schemas.openxmlformats.org/drawingml/2006/main" xmlns:r="http://schemas.openxmlformats.org/officeDocument/2006/relationships" xmlns:p="http://schemas.openxmlformats.org/presentationml/2006/main">
-  <p:cSld>
-    <p:spTree>
-      <p:nvGrpSpPr>
-        <p:cNvPr id="1" name=""/>
-        <p:cNvGrpSpPr/>
-        <p:nvPr/>
-      </p:nvGrpSpPr>
-      <p:grpSpPr>
-        <a:xfrm>
-          <a:off x="0" y="0"/>
-          <a:ext cx="0" cy="0"/>
-          <a:chOff x="0" y="0"/>
-          <a:chExt cx="0" cy="0"/>
-        </a:xfrm>
-      </p:grpSpPr>
-      <p:sp>
-        <p:nvSpPr>
-          <p:cNvPr id="2" name="מציין מיקום של תמונת שקופית 1"/>
-          <p:cNvSpPr>
-            <a:spLocks noGrp="1" noRot="1" noChangeAspect="1"/>
-          </p:cNvSpPr>
-          <p:nvPr>
-            <p:ph type="sldImg"/>
-          </p:nvPr>
-        </p:nvSpPr>
-        <p:spPr/>
-      </p:sp>
-      <p:sp>
-        <p:nvSpPr>
-          <p:cNvPr id="3" name="מציין מיקום של הערות 2"/>
-          <p:cNvSpPr>
-            <a:spLocks noGrp="1"/>
-          </p:cNvSpPr>
-          <p:nvPr>
-            <p:ph type="body" idx="1"/>
-          </p:nvPr>
-        </p:nvSpPr>
-        <p:spPr/>
-        <p:txBody>
-          <a:bodyPr/>
-          <a:lstStyle/>
-          <a:p>
-            <a:pPr algn="l"/>
-            <a:r>
-              <a:rPr lang="en-US" dirty="0"/>
-              <a:t>Duo to the complexity and time demanding characteristics of the floating point representation, the proposed architecture works with the fixed point representation.  Therefore, there was a need to find a proper way to divide fixed point values. </a:t>
-            </a:r>
-            <a:endParaRPr lang="he-IL" dirty="0"/>
-          </a:p>
-          <a:p>
-            <a:pPr algn="l"/>
-            <a:endParaRPr lang="en-US" dirty="0"/>
-          </a:p>
-          <a:p>
-            <a:pPr algn="l"/>
-            <a:r>
-              <a:rPr lang="en-US" dirty="0"/>
-              <a:t>The proposed method was to convert the fixed point number to an integer by shifting all fractional bits left (multiplying by 1024 ), dividing the converted number by using an integer divider(with known an simple algorithms, as describe in section Division in Hardware in the project report), and after the division shifting right the result in order to return to the fixed point representation.</a:t>
-            </a:r>
-          </a:p>
-          <a:p>
-            <a:pPr algn="l"/>
-            <a:endParaRPr lang="en-US" dirty="0"/>
-          </a:p>
-          <a:p>
-            <a:pPr algn="l"/>
-            <a:endParaRPr lang="he-IL" dirty="0"/>
-          </a:p>
-        </p:txBody>
-      </p:sp>
-      <p:sp>
-        <p:nvSpPr>
-          <p:cNvPr id="4" name="מציין מיקום של מספר שקופית 3"/>
-          <p:cNvSpPr>
-            <a:spLocks noGrp="1"/>
-          </p:cNvSpPr>
-          <p:nvPr>
-            <p:ph type="sldNum" sz="quarter" idx="5"/>
-          </p:nvPr>
-        </p:nvSpPr>
-        <p:spPr/>
-        <p:txBody>
-          <a:bodyPr/>
-          <a:lstStyle/>
-          <a:p>
-            <a:fld id="{A47A8C64-5C8B-40B3-A683-36C8893A9F2F}" type="slidenum">
-              <a:rPr lang="he-IL" smtClean="0"/>
-              <a:t>25</a:t>
-            </a:fld>
-            <a:endParaRPr lang="he-IL"/>
-          </a:p>
-        </p:txBody>
-      </p:sp>
-    </p:spTree>
-    <p:extLst>
-      <p:ext uri="{BB962C8B-B14F-4D97-AF65-F5344CB8AC3E}">
-        <p14:creationId xmlns:p14="http://schemas.microsoft.com/office/powerpoint/2010/main" val="836587795"/>
-      </p:ext>
-    </p:extLst>
-  </p:cSld>
-  <p:clrMapOvr>
-    <a:masterClrMapping/>
-  </p:clrMapOvr>
-</p:notes>
-</file>
-
-<file path=ppt/notesSlides/notesSlide6.xml><?xml version="1.0" encoding="utf-8"?>
-<p:notes xmlns:a="http://schemas.openxmlformats.org/drawingml/2006/main" xmlns:r="http://schemas.openxmlformats.org/officeDocument/2006/relationships" xmlns:p="http://schemas.openxmlformats.org/presentationml/2006/main">
-  <p:cSld>
-    <p:spTree>
-      <p:nvGrpSpPr>
-        <p:cNvPr id="1" name=""/>
-        <p:cNvGrpSpPr/>
-        <p:nvPr/>
-      </p:nvGrpSpPr>
-      <p:grpSpPr>
-        <a:xfrm>
-          <a:off x="0" y="0"/>
-          <a:ext cx="0" cy="0"/>
-          <a:chOff x="0" y="0"/>
-          <a:chExt cx="0" cy="0"/>
-        </a:xfrm>
-      </p:grpSpPr>
-      <p:sp>
-        <p:nvSpPr>
-          <p:cNvPr id="2" name="מציין מיקום של תמונת שקופית 1"/>
-          <p:cNvSpPr>
-            <a:spLocks noGrp="1" noRot="1" noChangeAspect="1"/>
-          </p:cNvSpPr>
-          <p:nvPr>
-            <p:ph type="sldImg"/>
-          </p:nvPr>
-        </p:nvSpPr>
-        <p:spPr/>
-      </p:sp>
-      <p:sp>
-        <p:nvSpPr>
-          <p:cNvPr id="3" name="מציין מיקום של הערות 2"/>
-          <p:cNvSpPr>
-            <a:spLocks noGrp="1"/>
-          </p:cNvSpPr>
-          <p:nvPr>
-            <p:ph type="body" idx="1"/>
-          </p:nvPr>
-        </p:nvSpPr>
-        <p:spPr/>
-        <p:txBody>
-          <a:bodyPr/>
-          <a:lstStyle/>
-          <a:p>
-            <a:pPr marL="0" marR="0" lvl="0" indent="0" algn="l" defTabSz="914400" rtl="1" eaLnBrk="1" fontAlgn="auto" latinLnBrk="0" hangingPunct="1">
-              <a:lnSpc>
-                <a:spcPct val="100000"/>
-              </a:lnSpc>
-              <a:spcBef>
-                <a:spcPts val="0"/>
-              </a:spcBef>
-              <a:spcAft>
-                <a:spcPts val="0"/>
-              </a:spcAft>
-              <a:buClrTx/>
-              <a:buSzTx/>
-              <a:buFontTx/>
-              <a:buNone/>
-              <a:tabLst/>
-              <a:defRPr/>
-            </a:pPr>
-            <a:r>
-              <a:rPr lang="en-US" dirty="0"/>
-              <a:t>The “New Means Calculation block” is responsible for centroids update step of the algorithm. It does so by dividing the value of each accumulator(stored at the local “Accumulator reg” register in the “Classification block”) by the number of points assigned to  them(stored at the local “Accumulator counter reg” register in the “Classification block”). </a:t>
-            </a:r>
-          </a:p>
-          <a:p>
-            <a:pPr algn="l"/>
-            <a:endParaRPr lang="he-IL" dirty="0"/>
-          </a:p>
-        </p:txBody>
-      </p:sp>
-      <p:sp>
-        <p:nvSpPr>
-          <p:cNvPr id="4" name="מציין מיקום של מספר שקופית 3"/>
-          <p:cNvSpPr>
-            <a:spLocks noGrp="1"/>
-          </p:cNvSpPr>
-          <p:nvPr>
-            <p:ph type="sldNum" sz="quarter" idx="5"/>
-          </p:nvPr>
-        </p:nvSpPr>
-        <p:spPr/>
-        <p:txBody>
-          <a:bodyPr/>
-          <a:lstStyle/>
-          <a:p>
-            <a:fld id="{A47A8C64-5C8B-40B3-A683-36C8893A9F2F}" type="slidenum">
-              <a:rPr lang="he-IL" smtClean="0"/>
-              <a:t>26</a:t>
-            </a:fld>
-            <a:endParaRPr lang="he-IL"/>
-          </a:p>
-        </p:txBody>
-      </p:sp>
-    </p:spTree>
-    <p:extLst>
-      <p:ext uri="{BB962C8B-B14F-4D97-AF65-F5344CB8AC3E}">
-        <p14:creationId xmlns:p14="http://schemas.microsoft.com/office/powerpoint/2010/main" val="3019220895"/>
-      </p:ext>
-    </p:extLst>
-  </p:cSld>
-  <p:clrMapOvr>
-    <a:masterClrMapping/>
-  </p:clrMapOvr>
-</p:notes>
-</file>
-
-<file path=ppt/notesSlides/notesSlide7.xml><?xml version="1.0" encoding="utf-8"?>
-<p:notes xmlns:a="http://schemas.openxmlformats.org/drawingml/2006/main" xmlns:r="http://schemas.openxmlformats.org/officeDocument/2006/relationships" xmlns:p="http://schemas.openxmlformats.org/presentationml/2006/main">
-  <p:cSld>
-    <p:spTree>
-      <p:nvGrpSpPr>
-        <p:cNvPr id="1" name=""/>
-        <p:cNvGrpSpPr/>
-        <p:nvPr/>
-      </p:nvGrpSpPr>
-      <p:grpSpPr>
-        <a:xfrm>
-          <a:off x="0" y="0"/>
-          <a:ext cx="0" cy="0"/>
-          <a:chOff x="0" y="0"/>
-          <a:chExt cx="0" cy="0"/>
-        </a:xfrm>
-      </p:grpSpPr>
-      <p:sp>
-        <p:nvSpPr>
-          <p:cNvPr id="2" name="מציין מיקום של תמונת שקופית 1"/>
-          <p:cNvSpPr>
-            <a:spLocks noGrp="1" noRot="1" noChangeAspect="1"/>
-          </p:cNvSpPr>
-          <p:nvPr>
-            <p:ph type="sldImg"/>
-          </p:nvPr>
-        </p:nvSpPr>
-        <p:spPr/>
-      </p:sp>
-      <p:sp>
-        <p:nvSpPr>
-          <p:cNvPr id="3" name="מציין מיקום של הערות 2"/>
-          <p:cNvSpPr>
-            <a:spLocks noGrp="1"/>
-          </p:cNvSpPr>
-          <p:nvPr>
-            <p:ph type="body" idx="1"/>
-          </p:nvPr>
-        </p:nvSpPr>
-        <p:spPr/>
-        <p:txBody>
-          <a:bodyPr/>
-          <a:lstStyle/>
-          <a:p>
-            <a:pPr algn="l"/>
-            <a:r>
-              <a:rPr lang="en-US" dirty="0"/>
-              <a:t>The convergence check block is responsible for the convergence check step of the algorithm. It does so by checking if any of the new centroids calculated in the “New Means Calculation block” value is close enough (within a pre-decided threshold stored at “Threshold register ” in the register file) to its old value(the value stored in the beginning of the iteration, stored in local registers of the classification block). </a:t>
-            </a:r>
-            <a:endParaRPr lang="he-IL" dirty="0"/>
-          </a:p>
-          <a:p>
-            <a:pPr algn="l"/>
-            <a:endParaRPr lang="en-US" dirty="0"/>
-          </a:p>
-          <a:p>
-            <a:pPr algn="l"/>
-            <a:endParaRPr lang="en-US" dirty="0"/>
-          </a:p>
-          <a:p>
-            <a:pPr algn="l"/>
-            <a:endParaRPr lang="he-IL" dirty="0"/>
-          </a:p>
-        </p:txBody>
-      </p:sp>
-      <p:sp>
-        <p:nvSpPr>
-          <p:cNvPr id="4" name="מציין מיקום של מספר שקופית 3"/>
-          <p:cNvSpPr>
-            <a:spLocks noGrp="1"/>
-          </p:cNvSpPr>
-          <p:nvPr>
-            <p:ph type="sldNum" sz="quarter" idx="5"/>
-          </p:nvPr>
-        </p:nvSpPr>
-        <p:spPr/>
-        <p:txBody>
-          <a:bodyPr/>
-          <a:lstStyle/>
-          <a:p>
-            <a:fld id="{A47A8C64-5C8B-40B3-A683-36C8893A9F2F}" type="slidenum">
-              <a:rPr lang="he-IL" smtClean="0"/>
-              <a:t>27</a:t>
-            </a:fld>
-            <a:endParaRPr lang="he-IL"/>
-          </a:p>
-        </p:txBody>
-      </p:sp>
-    </p:spTree>
-    <p:extLst>
-      <p:ext uri="{BB962C8B-B14F-4D97-AF65-F5344CB8AC3E}">
-        <p14:creationId xmlns:p14="http://schemas.microsoft.com/office/powerpoint/2010/main" val="1570971760"/>
-      </p:ext>
-    </p:extLst>
-  </p:cSld>
-  <p:clrMapOvr>
-    <a:masterClrMapping/>
-  </p:clrMapOvr>
-</p:notes>
-</file>
-
-<file path=ppt/notesSlides/notesSlide8.xml><?xml version="1.0" encoding="utf-8"?>
-<p:notes xmlns:a="http://schemas.openxmlformats.org/drawingml/2006/main" xmlns:r="http://schemas.openxmlformats.org/officeDocument/2006/relationships" xmlns:p="http://schemas.openxmlformats.org/presentationml/2006/main">
-  <p:cSld>
-    <p:spTree>
-      <p:nvGrpSpPr>
-        <p:cNvPr id="1" name=""/>
-        <p:cNvGrpSpPr/>
-        <p:nvPr/>
-      </p:nvGrpSpPr>
-      <p:grpSpPr>
-        <a:xfrm>
-          <a:off x="0" y="0"/>
-          <a:ext cx="0" cy="0"/>
-          <a:chOff x="0" y="0"/>
-          <a:chExt cx="0" cy="0"/>
-        </a:xfrm>
-      </p:grpSpPr>
-      <p:sp>
-        <p:nvSpPr>
-          <p:cNvPr id="2" name="מציין מיקום של תמונת שקופית 1"/>
-          <p:cNvSpPr>
-            <a:spLocks noGrp="1" noRot="1" noChangeAspect="1"/>
-          </p:cNvSpPr>
-          <p:nvPr>
-            <p:ph type="sldImg"/>
-          </p:nvPr>
-        </p:nvSpPr>
-        <p:spPr/>
-      </p:sp>
-      <p:sp>
-        <p:nvSpPr>
-          <p:cNvPr id="3" name="מציין מיקום של הערות 2"/>
-          <p:cNvSpPr>
-            <a:spLocks noGrp="1"/>
-          </p:cNvSpPr>
-          <p:nvPr>
-            <p:ph type="body" idx="1"/>
-          </p:nvPr>
-        </p:nvSpPr>
-        <p:spPr/>
-        <p:txBody>
-          <a:bodyPr/>
-          <a:lstStyle/>
-          <a:p>
-            <a:pPr marL="0" marR="0" lvl="0" indent="0" algn="l" defTabSz="914400" rtl="1" eaLnBrk="1" fontAlgn="auto" latinLnBrk="0" hangingPunct="1">
-              <a:lnSpc>
-                <a:spcPct val="100000"/>
-              </a:lnSpc>
-              <a:spcBef>
-                <a:spcPts val="0"/>
-              </a:spcBef>
-              <a:spcAft>
-                <a:spcPts val="0"/>
-              </a:spcAft>
-              <a:buClrTx/>
-              <a:buSzTx/>
-              <a:buFontTx/>
-              <a:buNone/>
-              <a:tabLst/>
-              <a:defRPr/>
-            </a:pPr>
-            <a:r>
-              <a:rPr lang="en-US" dirty="0"/>
-              <a:t>K means core pipeline view is divided into two pipelines, the division can be seen in the figure attached. The reason for this division is the Read-After-Write dependency between the 2 pipes.</a:t>
-            </a:r>
-            <a:br>
-              <a:rPr lang="en-US" dirty="0"/>
-            </a:br>
-            <a:r>
-              <a:rPr lang="en-US" dirty="0"/>
-              <a:t>This results by having one pipe working while the other wait for it's results. The left pipe result is all data points classified to clusters, which then can be used to calculate the new means for next iteration (or the last means if there will be a convergence). Then for the next iteration of classifying the data points, the new means value has to be ready, therefore the first pipe will "sleep" until second pipe will finish bringing the result of calculating new means</a:t>
-            </a:r>
-          </a:p>
-          <a:p>
-            <a:pPr algn="l"/>
-            <a:endParaRPr lang="he-IL" dirty="0"/>
-          </a:p>
-        </p:txBody>
-      </p:sp>
-      <p:sp>
-        <p:nvSpPr>
-          <p:cNvPr id="4" name="מציין מיקום של מספר שקופית 3"/>
-          <p:cNvSpPr>
-            <a:spLocks noGrp="1"/>
-          </p:cNvSpPr>
-          <p:nvPr>
-            <p:ph type="sldNum" sz="quarter" idx="5"/>
-          </p:nvPr>
-        </p:nvSpPr>
-        <p:spPr/>
-        <p:txBody>
-          <a:bodyPr/>
-          <a:lstStyle/>
-          <a:p>
-            <a:fld id="{A47A8C64-5C8B-40B3-A683-36C8893A9F2F}" type="slidenum">
-              <a:rPr lang="he-IL" smtClean="0"/>
-              <a:t>29</a:t>
-            </a:fld>
-            <a:endParaRPr lang="he-IL"/>
-          </a:p>
-        </p:txBody>
-      </p:sp>
-    </p:spTree>
-    <p:extLst>
-      <p:ext uri="{BB962C8B-B14F-4D97-AF65-F5344CB8AC3E}">
-        <p14:creationId xmlns:p14="http://schemas.microsoft.com/office/powerpoint/2010/main" val="426622170"/>
-      </p:ext>
-    </p:extLst>
-  </p:cSld>
-  <p:clrMapOvr>
-    <a:masterClrMapping/>
-  </p:clrMapOvr>
-</p:notes>
-</file>
-
-<file path=ppt/notesSlides/notesSlide9.xml><?xml version="1.0" encoding="utf-8"?>
-<p:notes xmlns:a="http://schemas.openxmlformats.org/drawingml/2006/main" xmlns:r="http://schemas.openxmlformats.org/officeDocument/2006/relationships" xmlns:p="http://schemas.openxmlformats.org/presentationml/2006/main">
-  <p:cSld>
-    <p:spTree>
-      <p:nvGrpSpPr>
-        <p:cNvPr id="1" name=""/>
-        <p:cNvGrpSpPr/>
-        <p:nvPr/>
-      </p:nvGrpSpPr>
-      <p:grpSpPr>
-        <a:xfrm>
-          <a:off x="0" y="0"/>
-          <a:ext cx="0" cy="0"/>
-          <a:chOff x="0" y="0"/>
-          <a:chExt cx="0" cy="0"/>
-        </a:xfrm>
-      </p:grpSpPr>
-      <p:sp>
-        <p:nvSpPr>
-          <p:cNvPr id="2" name="מציין מיקום של תמונת שקופית 1"/>
-          <p:cNvSpPr>
-            <a:spLocks noGrp="1" noRot="1" noChangeAspect="1"/>
-          </p:cNvSpPr>
-          <p:nvPr>
-            <p:ph type="sldImg"/>
-          </p:nvPr>
-        </p:nvSpPr>
-        <p:spPr/>
-      </p:sp>
-      <mc:AlternateContent xmlns:mc="http://schemas.openxmlformats.org/markup-compatibility/2006">
-        <mc:Choice xmlns:a14="http://schemas.microsoft.com/office/drawing/2010/main" Requires="a14">
+      <mc:AlternateContent xmlns:mc="http://schemas.openxmlformats.org/markup-compatibility/2006" xmlns:a14="http://schemas.microsoft.com/office/drawing/2010/main">
+        <mc:Choice Requires="a14">
           <p:sp>
             <p:nvSpPr>
               <p:cNvPr id="3" name="מציין מיקום של הערות 2"/>
@@ -2776,7 +954,7 @@
             </p:txBody>
           </p:sp>
         </mc:Choice>
-        <mc:Fallback>
+        <mc:Fallback xmlns="">
           <p:sp>
             <p:nvSpPr>
               <p:cNvPr id="3" name="מציין מיקום של הערות 2"/>
@@ -2954,6 +1132,1957 @@
     <p:extLst>
       <p:ext uri="{BB962C8B-B14F-4D97-AF65-F5344CB8AC3E}">
         <p14:creationId xmlns:p14="http://schemas.microsoft.com/office/powerpoint/2010/main" val="3888168311"/>
+      </p:ext>
+    </p:extLst>
+  </p:cSld>
+  <p:clrMapOvr>
+    <a:masterClrMapping/>
+  </p:clrMapOvr>
+</p:notes>
+</file>
+
+<file path=ppt/notesSlides/notesSlide11.xml><?xml version="1.0" encoding="utf-8"?>
+<p:notes xmlns:a="http://schemas.openxmlformats.org/drawingml/2006/main" xmlns:r="http://schemas.openxmlformats.org/officeDocument/2006/relationships" xmlns:p="http://schemas.openxmlformats.org/presentationml/2006/main">
+  <p:cSld>
+    <p:spTree>
+      <p:nvGrpSpPr>
+        <p:cNvPr id="1" name=""/>
+        <p:cNvGrpSpPr/>
+        <p:nvPr/>
+      </p:nvGrpSpPr>
+      <p:grpSpPr>
+        <a:xfrm>
+          <a:off x="0" y="0"/>
+          <a:ext cx="0" cy="0"/>
+          <a:chOff x="0" y="0"/>
+          <a:chExt cx="0" cy="0"/>
+        </a:xfrm>
+      </p:grpSpPr>
+      <p:sp>
+        <p:nvSpPr>
+          <p:cNvPr id="2" name="מציין מיקום של תמונת שקופית 1"/>
+          <p:cNvSpPr>
+            <a:spLocks noGrp="1" noRot="1" noChangeAspect="1"/>
+          </p:cNvSpPr>
+          <p:nvPr>
+            <p:ph type="sldImg"/>
+          </p:nvPr>
+        </p:nvSpPr>
+        <p:spPr/>
+      </p:sp>
+      <p:sp>
+        <p:nvSpPr>
+          <p:cNvPr id="3" name="מציין מיקום של הערות 2"/>
+          <p:cNvSpPr>
+            <a:spLocks noGrp="1"/>
+          </p:cNvSpPr>
+          <p:nvPr>
+            <p:ph type="body" idx="1"/>
+          </p:nvPr>
+        </p:nvSpPr>
+        <p:spPr/>
+        <p:txBody>
+          <a:bodyPr/>
+          <a:lstStyle/>
+          <a:p>
+            <a:pPr marL="0" marR="0" lvl="0" indent="0" algn="l" defTabSz="914400" rtl="1" eaLnBrk="1" fontAlgn="auto" latinLnBrk="0" hangingPunct="1">
+              <a:lnSpc>
+                <a:spcPct val="100000"/>
+              </a:lnSpc>
+              <a:spcBef>
+                <a:spcPts val="0"/>
+              </a:spcBef>
+              <a:spcAft>
+                <a:spcPts val="0"/>
+              </a:spcAft>
+              <a:buClrTx/>
+              <a:buSzTx/>
+              <a:buFontTx/>
+              <a:buNone/>
+              <a:tabLst/>
+              <a:defRPr/>
+            </a:pPr>
+            <a:r>
+              <a:rPr lang="en-US" dirty="0"/>
+              <a:t>The testbench made in order to verify the implementation of the design described herein was called top_tb.sv. Its structure is as shown below. It is basically composed by an instantiation of the K means TOP (which is the verified DUT), a clock generator and a stimulus generator and driver.</a:t>
+            </a:r>
+          </a:p>
+          <a:p>
+            <a:pPr algn="l"/>
+            <a:endParaRPr lang="he-IL" dirty="0"/>
+          </a:p>
+        </p:txBody>
+      </p:sp>
+      <p:sp>
+        <p:nvSpPr>
+          <p:cNvPr id="4" name="מציין מיקום של מספר שקופית 3"/>
+          <p:cNvSpPr>
+            <a:spLocks noGrp="1"/>
+          </p:cNvSpPr>
+          <p:nvPr>
+            <p:ph type="sldNum" sz="quarter" idx="5"/>
+          </p:nvPr>
+        </p:nvSpPr>
+        <p:spPr/>
+        <p:txBody>
+          <a:bodyPr/>
+          <a:lstStyle/>
+          <a:p>
+            <a:fld id="{A47A8C64-5C8B-40B3-A683-36C8893A9F2F}" type="slidenum">
+              <a:rPr lang="he-IL" smtClean="0"/>
+              <a:t>38</a:t>
+            </a:fld>
+            <a:endParaRPr lang="he-IL"/>
+          </a:p>
+        </p:txBody>
+      </p:sp>
+    </p:spTree>
+    <p:extLst>
+      <p:ext uri="{BB962C8B-B14F-4D97-AF65-F5344CB8AC3E}">
+        <p14:creationId xmlns:p14="http://schemas.microsoft.com/office/powerpoint/2010/main" val="2073914197"/>
+      </p:ext>
+    </p:extLst>
+  </p:cSld>
+  <p:clrMapOvr>
+    <a:masterClrMapping/>
+  </p:clrMapOvr>
+</p:notes>
+</file>
+
+<file path=ppt/notesSlides/notesSlide12.xml><?xml version="1.0" encoding="utf-8"?>
+<p:notes xmlns:a="http://schemas.openxmlformats.org/drawingml/2006/main" xmlns:r="http://schemas.openxmlformats.org/officeDocument/2006/relationships" xmlns:p="http://schemas.openxmlformats.org/presentationml/2006/main">
+  <p:cSld>
+    <p:spTree>
+      <p:nvGrpSpPr>
+        <p:cNvPr id="1" name=""/>
+        <p:cNvGrpSpPr/>
+        <p:nvPr/>
+      </p:nvGrpSpPr>
+      <p:grpSpPr>
+        <a:xfrm>
+          <a:off x="0" y="0"/>
+          <a:ext cx="0" cy="0"/>
+          <a:chOff x="0" y="0"/>
+          <a:chExt cx="0" cy="0"/>
+        </a:xfrm>
+      </p:grpSpPr>
+      <p:sp>
+        <p:nvSpPr>
+          <p:cNvPr id="2" name="מציין מיקום של תמונת שקופית 1"/>
+          <p:cNvSpPr>
+            <a:spLocks noGrp="1" noRot="1" noChangeAspect="1"/>
+          </p:cNvSpPr>
+          <p:nvPr>
+            <p:ph type="sldImg"/>
+          </p:nvPr>
+        </p:nvSpPr>
+        <p:spPr/>
+      </p:sp>
+      <p:sp>
+        <p:nvSpPr>
+          <p:cNvPr id="3" name="מציין מיקום של הערות 2"/>
+          <p:cNvSpPr>
+            <a:spLocks noGrp="1"/>
+          </p:cNvSpPr>
+          <p:nvPr>
+            <p:ph type="body" idx="1"/>
+          </p:nvPr>
+        </p:nvSpPr>
+        <p:spPr/>
+        <p:txBody>
+          <a:bodyPr/>
+          <a:lstStyle/>
+          <a:p>
+            <a:pPr algn="l"/>
+            <a:r>
+              <a:rPr lang="en-US" dirty="0"/>
+              <a:t>The main parts of the IP functionality were marked In the attached figure.</a:t>
+            </a:r>
+          </a:p>
+          <a:p>
+            <a:pPr algn="l"/>
+            <a:r>
+              <a:rPr lang="en-US" dirty="0"/>
+              <a:t>First, the testbench configures the centroid’s registers with their initial value, as well as the registers which contain the RAM first and final addresses. This part was named “Configure registers” in the attached figure.</a:t>
+            </a:r>
+          </a:p>
+          <a:p>
+            <a:pPr algn="l"/>
+            <a:r>
+              <a:rPr lang="en-US" dirty="0"/>
+              <a:t>Then, the testbench writes the data point to the RAM via indirect access. This part was named “Indirect writing to RAM” in the attached figure.</a:t>
+            </a:r>
+          </a:p>
+          <a:p>
+            <a:pPr algn="l"/>
+            <a:r>
+              <a:rPr lang="en-US" dirty="0"/>
+              <a:t>Finally, in the attached figure, in the part called “Algorithm calculation”, centroid registers, accumulators and accumulator counters can be seen changing with the progress of the algorithm. Also, in this part, the “Has converged” signal was marked in its rising edge, meaning the algorithm has reached convergence. Eight clock cycles after this occurs, the “interrupt” signal was marked in its rising edge, meaning the core is communicating to its host that it has finished its purpose.</a:t>
+            </a:r>
+          </a:p>
+          <a:p>
+            <a:pPr algn="l"/>
+            <a:endParaRPr lang="en-US" dirty="0"/>
+          </a:p>
+          <a:p>
+            <a:pPr algn="l"/>
+            <a:endParaRPr lang="he-IL" dirty="0"/>
+          </a:p>
+        </p:txBody>
+      </p:sp>
+      <p:sp>
+        <p:nvSpPr>
+          <p:cNvPr id="4" name="מציין מיקום של מספר שקופית 3"/>
+          <p:cNvSpPr>
+            <a:spLocks noGrp="1"/>
+          </p:cNvSpPr>
+          <p:nvPr>
+            <p:ph type="sldNum" sz="quarter" idx="5"/>
+          </p:nvPr>
+        </p:nvSpPr>
+        <p:spPr/>
+        <p:txBody>
+          <a:bodyPr/>
+          <a:lstStyle/>
+          <a:p>
+            <a:fld id="{A47A8C64-5C8B-40B3-A683-36C8893A9F2F}" type="slidenum">
+              <a:rPr lang="he-IL" smtClean="0"/>
+              <a:t>40</a:t>
+            </a:fld>
+            <a:endParaRPr lang="he-IL"/>
+          </a:p>
+        </p:txBody>
+      </p:sp>
+    </p:spTree>
+    <p:extLst>
+      <p:ext uri="{BB962C8B-B14F-4D97-AF65-F5344CB8AC3E}">
+        <p14:creationId xmlns:p14="http://schemas.microsoft.com/office/powerpoint/2010/main" val="2274371036"/>
+      </p:ext>
+    </p:extLst>
+  </p:cSld>
+  <p:clrMapOvr>
+    <a:masterClrMapping/>
+  </p:clrMapOvr>
+</p:notes>
+</file>
+
+<file path=ppt/notesSlides/notesSlide13.xml><?xml version="1.0" encoding="utf-8"?>
+<p:notes xmlns:a="http://schemas.openxmlformats.org/drawingml/2006/main" xmlns:r="http://schemas.openxmlformats.org/officeDocument/2006/relationships" xmlns:p="http://schemas.openxmlformats.org/presentationml/2006/main">
+  <p:cSld>
+    <p:spTree>
+      <p:nvGrpSpPr>
+        <p:cNvPr id="1" name=""/>
+        <p:cNvGrpSpPr/>
+        <p:nvPr/>
+      </p:nvGrpSpPr>
+      <p:grpSpPr>
+        <a:xfrm>
+          <a:off x="0" y="0"/>
+          <a:ext cx="0" cy="0"/>
+          <a:chOff x="0" y="0"/>
+          <a:chExt cx="0" cy="0"/>
+        </a:xfrm>
+      </p:grpSpPr>
+      <p:sp>
+        <p:nvSpPr>
+          <p:cNvPr id="2" name="מציין מיקום של תמונת שקופית 1"/>
+          <p:cNvSpPr>
+            <a:spLocks noGrp="1" noRot="1" noChangeAspect="1"/>
+          </p:cNvSpPr>
+          <p:nvPr>
+            <p:ph type="sldImg"/>
+          </p:nvPr>
+        </p:nvSpPr>
+        <p:spPr/>
+      </p:sp>
+      <p:sp>
+        <p:nvSpPr>
+          <p:cNvPr id="3" name="מציין מיקום של הערות 2"/>
+          <p:cNvSpPr>
+            <a:spLocks noGrp="1"/>
+          </p:cNvSpPr>
+          <p:nvPr>
+            <p:ph type="body" idx="1"/>
+          </p:nvPr>
+        </p:nvSpPr>
+        <p:spPr/>
+        <p:txBody>
+          <a:bodyPr/>
+          <a:lstStyle/>
+          <a:p>
+            <a:pPr marL="0" marR="0" lvl="0" indent="0" algn="l" defTabSz="914400" rtl="1" eaLnBrk="1" fontAlgn="auto" latinLnBrk="0" hangingPunct="1">
+              <a:lnSpc>
+                <a:spcPct val="100000"/>
+              </a:lnSpc>
+              <a:spcBef>
+                <a:spcPts val="0"/>
+              </a:spcBef>
+              <a:spcAft>
+                <a:spcPts val="0"/>
+              </a:spcAft>
+              <a:buClrTx/>
+              <a:buSzTx/>
+              <a:buFontTx/>
+              <a:buNone/>
+              <a:tabLst/>
+              <a:defRPr/>
+            </a:pPr>
+            <a:r>
+              <a:rPr lang="en-US" dirty="0"/>
+              <a:t>As it can be seen from the attached figure, the “Do nothing” test indeed works. It compares at its first iteration the initial centroid values with the calculated ones and concludes the algorithm has converged.</a:t>
+            </a:r>
+          </a:p>
+          <a:p>
+            <a:pPr algn="l"/>
+            <a:endParaRPr lang="he-IL" dirty="0"/>
+          </a:p>
+        </p:txBody>
+      </p:sp>
+      <p:sp>
+        <p:nvSpPr>
+          <p:cNvPr id="4" name="מציין מיקום של מספר שקופית 3"/>
+          <p:cNvSpPr>
+            <a:spLocks noGrp="1"/>
+          </p:cNvSpPr>
+          <p:nvPr>
+            <p:ph type="sldNum" sz="quarter" idx="5"/>
+          </p:nvPr>
+        </p:nvSpPr>
+        <p:spPr/>
+        <p:txBody>
+          <a:bodyPr/>
+          <a:lstStyle/>
+          <a:p>
+            <a:fld id="{A47A8C64-5C8B-40B3-A683-36C8893A9F2F}" type="slidenum">
+              <a:rPr lang="he-IL" smtClean="0"/>
+              <a:t>41</a:t>
+            </a:fld>
+            <a:endParaRPr lang="he-IL"/>
+          </a:p>
+        </p:txBody>
+      </p:sp>
+    </p:spTree>
+    <p:extLst>
+      <p:ext uri="{BB962C8B-B14F-4D97-AF65-F5344CB8AC3E}">
+        <p14:creationId xmlns:p14="http://schemas.microsoft.com/office/powerpoint/2010/main" val="2373217856"/>
+      </p:ext>
+    </p:extLst>
+  </p:cSld>
+  <p:clrMapOvr>
+    <a:masterClrMapping/>
+  </p:clrMapOvr>
+</p:notes>
+</file>
+
+<file path=ppt/notesSlides/notesSlide14.xml><?xml version="1.0" encoding="utf-8"?>
+<p:notes xmlns:a="http://schemas.openxmlformats.org/drawingml/2006/main" xmlns:r="http://schemas.openxmlformats.org/officeDocument/2006/relationships" xmlns:p="http://schemas.openxmlformats.org/presentationml/2006/main">
+  <p:cSld>
+    <p:spTree>
+      <p:nvGrpSpPr>
+        <p:cNvPr id="1" name=""/>
+        <p:cNvGrpSpPr/>
+        <p:nvPr/>
+      </p:nvGrpSpPr>
+      <p:grpSpPr>
+        <a:xfrm>
+          <a:off x="0" y="0"/>
+          <a:ext cx="0" cy="0"/>
+          <a:chOff x="0" y="0"/>
+          <a:chExt cx="0" cy="0"/>
+        </a:xfrm>
+      </p:grpSpPr>
+      <p:sp>
+        <p:nvSpPr>
+          <p:cNvPr id="2" name="מציין מיקום של תמונת שקופית 1"/>
+          <p:cNvSpPr>
+            <a:spLocks noGrp="1" noRot="1" noChangeAspect="1"/>
+          </p:cNvSpPr>
+          <p:nvPr>
+            <p:ph type="sldImg"/>
+          </p:nvPr>
+        </p:nvSpPr>
+        <p:spPr/>
+      </p:sp>
+      <p:sp>
+        <p:nvSpPr>
+          <p:cNvPr id="3" name="מציין מיקום של הערות 2"/>
+          <p:cNvSpPr>
+            <a:spLocks noGrp="1"/>
+          </p:cNvSpPr>
+          <p:nvPr>
+            <p:ph type="body" idx="1"/>
+          </p:nvPr>
+        </p:nvSpPr>
+        <p:spPr/>
+        <p:txBody>
+          <a:bodyPr/>
+          <a:lstStyle/>
+          <a:p>
+            <a:pPr marL="0" marR="0" lvl="0" indent="0" algn="l" defTabSz="914400" rtl="1" eaLnBrk="1" fontAlgn="auto" latinLnBrk="0" hangingPunct="1">
+              <a:lnSpc>
+                <a:spcPct val="100000"/>
+              </a:lnSpc>
+              <a:spcBef>
+                <a:spcPts val="0"/>
+              </a:spcBef>
+              <a:spcAft>
+                <a:spcPts val="0"/>
+              </a:spcAft>
+              <a:buClrTx/>
+              <a:buSzTx/>
+              <a:buFontTx/>
+              <a:buNone/>
+              <a:tabLst/>
+              <a:defRPr/>
+            </a:pPr>
+            <a:r>
+              <a:rPr lang="en-US" dirty="0"/>
+              <a:t>In this section, a brief summary of this project is done and our conclusions exposed. This section will be divided into three. First, a summary about the innovations in our design compared to the design present in the paper this project was based on. Then, an analysis of the achieved performance of the IP and finally a section describing future improvements of the IP.</a:t>
+            </a:r>
+          </a:p>
+          <a:p>
+            <a:pPr algn="l"/>
+            <a:endParaRPr lang="he-IL" dirty="0"/>
+          </a:p>
+        </p:txBody>
+      </p:sp>
+      <p:sp>
+        <p:nvSpPr>
+          <p:cNvPr id="4" name="מציין מיקום של מספר שקופית 3"/>
+          <p:cNvSpPr>
+            <a:spLocks noGrp="1"/>
+          </p:cNvSpPr>
+          <p:nvPr>
+            <p:ph type="sldNum" sz="quarter" idx="5"/>
+          </p:nvPr>
+        </p:nvSpPr>
+        <p:spPr/>
+        <p:txBody>
+          <a:bodyPr/>
+          <a:lstStyle/>
+          <a:p>
+            <a:fld id="{A47A8C64-5C8B-40B3-A683-36C8893A9F2F}" type="slidenum">
+              <a:rPr lang="he-IL" smtClean="0"/>
+              <a:t>45</a:t>
+            </a:fld>
+            <a:endParaRPr lang="he-IL"/>
+          </a:p>
+        </p:txBody>
+      </p:sp>
+    </p:spTree>
+    <p:extLst>
+      <p:ext uri="{BB962C8B-B14F-4D97-AF65-F5344CB8AC3E}">
+        <p14:creationId xmlns:p14="http://schemas.microsoft.com/office/powerpoint/2010/main" val="1628832487"/>
+      </p:ext>
+    </p:extLst>
+  </p:cSld>
+  <p:clrMapOvr>
+    <a:masterClrMapping/>
+  </p:clrMapOvr>
+</p:notes>
+</file>
+
+<file path=ppt/notesSlides/notesSlide15.xml><?xml version="1.0" encoding="utf-8"?>
+<p:notes xmlns:a="http://schemas.openxmlformats.org/drawingml/2006/main" xmlns:r="http://schemas.openxmlformats.org/officeDocument/2006/relationships" xmlns:p="http://schemas.openxmlformats.org/presentationml/2006/main">
+  <p:cSld>
+    <p:spTree>
+      <p:nvGrpSpPr>
+        <p:cNvPr id="1" name=""/>
+        <p:cNvGrpSpPr/>
+        <p:nvPr/>
+      </p:nvGrpSpPr>
+      <p:grpSpPr>
+        <a:xfrm>
+          <a:off x="0" y="0"/>
+          <a:ext cx="0" cy="0"/>
+          <a:chOff x="0" y="0"/>
+          <a:chExt cx="0" cy="0"/>
+        </a:xfrm>
+      </p:grpSpPr>
+      <p:sp>
+        <p:nvSpPr>
+          <p:cNvPr id="2" name="מציין מיקום של תמונת שקופית 1"/>
+          <p:cNvSpPr>
+            <a:spLocks noGrp="1" noRot="1" noChangeAspect="1"/>
+          </p:cNvSpPr>
+          <p:nvPr>
+            <p:ph type="sldImg"/>
+          </p:nvPr>
+        </p:nvSpPr>
+        <p:spPr/>
+      </p:sp>
+      <p:sp>
+        <p:nvSpPr>
+          <p:cNvPr id="3" name="מציין מיקום של הערות 2"/>
+          <p:cNvSpPr>
+            <a:spLocks noGrp="1"/>
+          </p:cNvSpPr>
+          <p:nvPr>
+            <p:ph type="body" idx="1"/>
+          </p:nvPr>
+        </p:nvSpPr>
+        <p:spPr/>
+        <p:txBody>
+          <a:bodyPr/>
+          <a:lstStyle/>
+          <a:p>
+            <a:pPr algn="l"/>
+            <a:r>
+              <a:rPr lang="en-US" dirty="0"/>
+              <a:t> One main different are the units used for the architecture – the proposed paper has a specific RAM and DIV units. Due to academical limits – there was a choice for a DIV that will provide performance despite this limitation – for more refer to section ‎2.6.2.3.</a:t>
+            </a:r>
+          </a:p>
+          <a:p>
+            <a:pPr algn="l"/>
+            <a:r>
+              <a:rPr lang="en-US" dirty="0"/>
+              <a:t>Another difference is the interface description. Although the paper proposes an IP architecture, it does not explicit explain the interface specifications, therefore not being clear how the IP could be integrated with a CPU. In our design, there is a clear interface description as described in section ‎2.5. Because of its simplicity and wide use in the industry, we choose to use APB communication protocol (as presented in chapter 1 - where the CPU should be the master and the K means IP is the slave) as our interface protocol. </a:t>
+            </a:r>
+          </a:p>
+          <a:p>
+            <a:pPr algn="l"/>
+            <a:r>
+              <a:rPr lang="en-US" dirty="0"/>
+              <a:t>The last main difference we would like to mention is the micro architecture implementation extension. Even though the paper presents a k means-core architecture, it does not extend on the low level implementation. In our project, micro architecture, down to private implementation, was extended.</a:t>
+            </a:r>
+          </a:p>
+          <a:p>
+            <a:pPr algn="l"/>
+            <a:endParaRPr lang="en-US" dirty="0"/>
+          </a:p>
+          <a:p>
+            <a:pPr algn="l"/>
+            <a:endParaRPr lang="he-IL" dirty="0"/>
+          </a:p>
+        </p:txBody>
+      </p:sp>
+      <p:sp>
+        <p:nvSpPr>
+          <p:cNvPr id="4" name="מציין מיקום של מספר שקופית 3"/>
+          <p:cNvSpPr>
+            <a:spLocks noGrp="1"/>
+          </p:cNvSpPr>
+          <p:nvPr>
+            <p:ph type="sldNum" sz="quarter" idx="5"/>
+          </p:nvPr>
+        </p:nvSpPr>
+        <p:spPr/>
+        <p:txBody>
+          <a:bodyPr/>
+          <a:lstStyle/>
+          <a:p>
+            <a:fld id="{A47A8C64-5C8B-40B3-A683-36C8893A9F2F}" type="slidenum">
+              <a:rPr lang="he-IL" smtClean="0"/>
+              <a:t>46</a:t>
+            </a:fld>
+            <a:endParaRPr lang="he-IL"/>
+          </a:p>
+        </p:txBody>
+      </p:sp>
+    </p:spTree>
+    <p:extLst>
+      <p:ext uri="{BB962C8B-B14F-4D97-AF65-F5344CB8AC3E}">
+        <p14:creationId xmlns:p14="http://schemas.microsoft.com/office/powerpoint/2010/main" val="627816801"/>
+      </p:ext>
+    </p:extLst>
+  </p:cSld>
+  <p:clrMapOvr>
+    <a:masterClrMapping/>
+  </p:clrMapOvr>
+</p:notes>
+</file>
+
+<file path=ppt/notesSlides/notesSlide16.xml><?xml version="1.0" encoding="utf-8"?>
+<p:notes xmlns:a="http://schemas.openxmlformats.org/drawingml/2006/main" xmlns:r="http://schemas.openxmlformats.org/officeDocument/2006/relationships" xmlns:p="http://schemas.openxmlformats.org/presentationml/2006/main">
+  <p:cSld>
+    <p:spTree>
+      <p:nvGrpSpPr>
+        <p:cNvPr id="1" name=""/>
+        <p:cNvGrpSpPr/>
+        <p:nvPr/>
+      </p:nvGrpSpPr>
+      <p:grpSpPr>
+        <a:xfrm>
+          <a:off x="0" y="0"/>
+          <a:ext cx="0" cy="0"/>
+          <a:chOff x="0" y="0"/>
+          <a:chExt cx="0" cy="0"/>
+        </a:xfrm>
+      </p:grpSpPr>
+      <p:sp>
+        <p:nvSpPr>
+          <p:cNvPr id="2" name="מציין מיקום של תמונת שקופית 1"/>
+          <p:cNvSpPr>
+            <a:spLocks noGrp="1" noRot="1" noChangeAspect="1"/>
+          </p:cNvSpPr>
+          <p:nvPr>
+            <p:ph type="sldImg"/>
+          </p:nvPr>
+        </p:nvSpPr>
+        <p:spPr/>
+      </p:sp>
+      <p:sp>
+        <p:nvSpPr>
+          <p:cNvPr id="3" name="מציין מיקום של הערות 2"/>
+          <p:cNvSpPr>
+            <a:spLocks noGrp="1"/>
+          </p:cNvSpPr>
+          <p:nvPr>
+            <p:ph type="body" idx="1"/>
+          </p:nvPr>
+        </p:nvSpPr>
+        <p:spPr/>
+        <p:txBody>
+          <a:bodyPr/>
+          <a:lstStyle/>
+          <a:p>
+            <a:pPr algn="l"/>
+            <a:r>
+              <a:rPr lang="en-US" dirty="0"/>
+              <a:t>The total running time of the algorithm in our IP for the example described in section ‎4.2.1 was of 167*10^7 [</a:t>
+            </a:r>
+            <a:r>
+              <a:rPr lang="en-US" dirty="0" err="1"/>
+              <a:t>fsec</a:t>
+            </a:r>
+            <a:r>
+              <a:rPr lang="en-US" dirty="0"/>
+              <a:t>]=1.67 [</a:t>
+            </a:r>
+            <a:r>
+              <a:rPr lang="en-US" dirty="0" err="1"/>
+              <a:t>μsec</a:t>
+            </a:r>
+            <a:r>
+              <a:rPr lang="en-US" dirty="0"/>
+              <a:t>] for a simulation done with clock cycle set at 10 [</a:t>
+            </a:r>
+            <a:r>
+              <a:rPr lang="en-US" dirty="0" err="1"/>
+              <a:t>nsec</a:t>
+            </a:r>
+            <a:r>
+              <a:rPr lang="en-US" dirty="0"/>
+              <a:t>]. Duo to the fact that in our Synthesis process we set the clock cycle to be 7.5[</a:t>
+            </a:r>
+            <a:r>
+              <a:rPr lang="en-US" dirty="0" err="1"/>
+              <a:t>nsec</a:t>
+            </a:r>
+            <a:r>
+              <a:rPr lang="en-US" dirty="0"/>
+              <a:t>], the actual running time of the K means IP for the example described in section ‎4.2.1 was would be a total of 1.2525[</a:t>
+            </a:r>
+            <a:r>
+              <a:rPr lang="en-US" dirty="0" err="1"/>
+              <a:t>μsec</a:t>
+            </a:r>
+            <a:r>
+              <a:rPr lang="en-US" dirty="0"/>
+              <a:t>] .</a:t>
+            </a:r>
+          </a:p>
+          <a:p>
+            <a:pPr algn="l"/>
+            <a:r>
+              <a:rPr lang="en-US" dirty="0"/>
+              <a:t>In the other hand, the </a:t>
+            </a:r>
+            <a:r>
+              <a:rPr lang="en-US" dirty="0" err="1"/>
+              <a:t>Matlab</a:t>
+            </a:r>
+            <a:r>
+              <a:rPr lang="en-US" dirty="0"/>
+              <a:t> script used to verified the correctness of the output for input example described in section ‎4.2.1 took approximately 1.68 [sec], meaning the speedup for the algorithm using the IP was of 1.34*10^6. </a:t>
+            </a:r>
+          </a:p>
+          <a:p>
+            <a:pPr algn="l"/>
+            <a:endParaRPr lang="he-IL" dirty="0"/>
+          </a:p>
+        </p:txBody>
+      </p:sp>
+      <p:sp>
+        <p:nvSpPr>
+          <p:cNvPr id="4" name="מציין מיקום של מספר שקופית 3"/>
+          <p:cNvSpPr>
+            <a:spLocks noGrp="1"/>
+          </p:cNvSpPr>
+          <p:nvPr>
+            <p:ph type="sldNum" sz="quarter" idx="5"/>
+          </p:nvPr>
+        </p:nvSpPr>
+        <p:spPr/>
+        <p:txBody>
+          <a:bodyPr/>
+          <a:lstStyle/>
+          <a:p>
+            <a:fld id="{A47A8C64-5C8B-40B3-A683-36C8893A9F2F}" type="slidenum">
+              <a:rPr lang="he-IL" smtClean="0"/>
+              <a:t>47</a:t>
+            </a:fld>
+            <a:endParaRPr lang="he-IL"/>
+          </a:p>
+        </p:txBody>
+      </p:sp>
+    </p:spTree>
+    <p:extLst>
+      <p:ext uri="{BB962C8B-B14F-4D97-AF65-F5344CB8AC3E}">
+        <p14:creationId xmlns:p14="http://schemas.microsoft.com/office/powerpoint/2010/main" val="1115077963"/>
+      </p:ext>
+    </p:extLst>
+  </p:cSld>
+  <p:clrMapOvr>
+    <a:masterClrMapping/>
+  </p:clrMapOvr>
+</p:notes>
+</file>
+
+<file path=ppt/notesSlides/notesSlide17.xml><?xml version="1.0" encoding="utf-8"?>
+<p:notes xmlns:a="http://schemas.openxmlformats.org/drawingml/2006/main" xmlns:r="http://schemas.openxmlformats.org/officeDocument/2006/relationships" xmlns:p="http://schemas.openxmlformats.org/presentationml/2006/main">
+  <p:cSld>
+    <p:spTree>
+      <p:nvGrpSpPr>
+        <p:cNvPr id="1" name=""/>
+        <p:cNvGrpSpPr/>
+        <p:nvPr/>
+      </p:nvGrpSpPr>
+      <p:grpSpPr>
+        <a:xfrm>
+          <a:off x="0" y="0"/>
+          <a:ext cx="0" cy="0"/>
+          <a:chOff x="0" y="0"/>
+          <a:chExt cx="0" cy="0"/>
+        </a:xfrm>
+      </p:grpSpPr>
+      <p:sp>
+        <p:nvSpPr>
+          <p:cNvPr id="2" name="מציין מיקום של תמונת שקופית 1"/>
+          <p:cNvSpPr>
+            <a:spLocks noGrp="1" noRot="1" noChangeAspect="1"/>
+          </p:cNvSpPr>
+          <p:nvPr>
+            <p:ph type="sldImg"/>
+          </p:nvPr>
+        </p:nvSpPr>
+        <p:spPr/>
+      </p:sp>
+      <p:sp>
+        <p:nvSpPr>
+          <p:cNvPr id="3" name="מציין מיקום של הערות 2"/>
+          <p:cNvSpPr>
+            <a:spLocks noGrp="1"/>
+          </p:cNvSpPr>
+          <p:nvPr>
+            <p:ph type="body" idx="1"/>
+          </p:nvPr>
+        </p:nvSpPr>
+        <p:spPr/>
+        <p:txBody>
+          <a:bodyPr/>
+          <a:lstStyle/>
+          <a:p>
+            <a:pPr marL="0" indent="0" algn="l">
+              <a:buNone/>
+            </a:pPr>
+            <a:r>
+              <a:rPr lang="en-US" dirty="0"/>
+              <a:t>• The use of large dividers affects not only the total area size, but also it sets the critical path. A way of solving (even if partially) this problem could be using smaller dividers, at the cost of the calculation accuracy. Future analysis could be done to the better describe the tradeoff between calculation accuracy and time and area constrains and choose the optimal DIVIDERS size.</a:t>
+            </a:r>
+          </a:p>
+          <a:p>
+            <a:pPr marL="0" indent="0" algn="l">
+              <a:buNone/>
+            </a:pPr>
+            <a:r>
+              <a:rPr lang="en-US" dirty="0"/>
+              <a:t>• In our design, the number of clusters was predetermined to be eight. For future improvement, the code could be changed to allow the user to choose how many clusters to use in the algorithm.</a:t>
+            </a:r>
+          </a:p>
+          <a:p>
+            <a:pPr marL="0" indent="0" algn="l">
+              <a:buNone/>
+            </a:pPr>
+            <a:r>
+              <a:rPr lang="en-US" dirty="0"/>
+              <a:t>• In our design, the input data size and dimensions were predetermined. For future improvement, the code could be changed to allow the user to choose the input data size and dimensions of the algorithm.</a:t>
+            </a:r>
+          </a:p>
+          <a:p>
+            <a:pPr marL="0" indent="0" algn="l">
+              <a:buNone/>
+            </a:pPr>
+            <a:r>
+              <a:rPr lang="en-US" dirty="0"/>
+              <a:t>• A maximum iterations feature could be added to the design. As it is not certain the number of iterations it will take for the algorithm to reach convergence, a future register could be added enabling the user to set maximum number of iterations wanted to be ran, ending the algorithm after this predetermined number of iterations whether convergence has been achieved or not.</a:t>
+            </a:r>
+          </a:p>
+          <a:p>
+            <a:pPr marL="0" indent="0" algn="l">
+              <a:buNone/>
+            </a:pPr>
+            <a:r>
+              <a:rPr lang="en-US" dirty="0"/>
+              <a:t>• Duo to the chosen architecture of two data dependent pipelines which run in series, the clock domain could be improved by having one clock for each pipeline. In this manner, at least one of the pipelines (the slower one between the two) could have better performance, improving the overall performance. This could possible be done also for the Register File, allowing the APB communications to be faster and therefore improving even more the total performance.</a:t>
+            </a:r>
+          </a:p>
+          <a:p>
+            <a:pPr algn="l"/>
+            <a:endParaRPr lang="en-US" dirty="0"/>
+          </a:p>
+          <a:p>
+            <a:pPr algn="l"/>
+            <a:endParaRPr lang="he-IL" dirty="0"/>
+          </a:p>
+        </p:txBody>
+      </p:sp>
+      <p:sp>
+        <p:nvSpPr>
+          <p:cNvPr id="4" name="מציין מיקום של מספר שקופית 3"/>
+          <p:cNvSpPr>
+            <a:spLocks noGrp="1"/>
+          </p:cNvSpPr>
+          <p:nvPr>
+            <p:ph type="sldNum" sz="quarter" idx="5"/>
+          </p:nvPr>
+        </p:nvSpPr>
+        <p:spPr/>
+        <p:txBody>
+          <a:bodyPr/>
+          <a:lstStyle/>
+          <a:p>
+            <a:fld id="{A47A8C64-5C8B-40B3-A683-36C8893A9F2F}" type="slidenum">
+              <a:rPr lang="he-IL" smtClean="0"/>
+              <a:t>48</a:t>
+            </a:fld>
+            <a:endParaRPr lang="he-IL"/>
+          </a:p>
+        </p:txBody>
+      </p:sp>
+    </p:spTree>
+    <p:extLst>
+      <p:ext uri="{BB962C8B-B14F-4D97-AF65-F5344CB8AC3E}">
+        <p14:creationId xmlns:p14="http://schemas.microsoft.com/office/powerpoint/2010/main" val="3578121929"/>
+      </p:ext>
+    </p:extLst>
+  </p:cSld>
+  <p:clrMapOvr>
+    <a:masterClrMapping/>
+  </p:clrMapOvr>
+</p:notes>
+</file>
+
+<file path=ppt/notesSlides/notesSlide18.xml><?xml version="1.0" encoding="utf-8"?>
+<p:notes xmlns:a="http://schemas.openxmlformats.org/drawingml/2006/main" xmlns:r="http://schemas.openxmlformats.org/officeDocument/2006/relationships" xmlns:p="http://schemas.openxmlformats.org/presentationml/2006/main">
+  <p:cSld>
+    <p:spTree>
+      <p:nvGrpSpPr>
+        <p:cNvPr id="1" name=""/>
+        <p:cNvGrpSpPr/>
+        <p:nvPr/>
+      </p:nvGrpSpPr>
+      <p:grpSpPr>
+        <a:xfrm>
+          <a:off x="0" y="0"/>
+          <a:ext cx="0" cy="0"/>
+          <a:chOff x="0" y="0"/>
+          <a:chExt cx="0" cy="0"/>
+        </a:xfrm>
+      </p:grpSpPr>
+      <p:sp>
+        <p:nvSpPr>
+          <p:cNvPr id="2" name="מציין מיקום של תמונת שקופית 1"/>
+          <p:cNvSpPr>
+            <a:spLocks noGrp="1" noRot="1" noChangeAspect="1"/>
+          </p:cNvSpPr>
+          <p:nvPr>
+            <p:ph type="sldImg"/>
+          </p:nvPr>
+        </p:nvSpPr>
+        <p:spPr/>
+      </p:sp>
+      <p:sp>
+        <p:nvSpPr>
+          <p:cNvPr id="3" name="מציין מיקום של הערות 2"/>
+          <p:cNvSpPr>
+            <a:spLocks noGrp="1"/>
+          </p:cNvSpPr>
+          <p:nvPr>
+            <p:ph type="body" idx="1"/>
+          </p:nvPr>
+        </p:nvSpPr>
+        <p:spPr/>
+        <p:txBody>
+          <a:bodyPr/>
+          <a:lstStyle/>
+          <a:p>
+            <a:pPr marL="0" indent="0" algn="l">
+              <a:buNone/>
+            </a:pPr>
+            <a:r>
+              <a:rPr lang="en-US" dirty="0"/>
+              <a:t>• The use of large dividers affects not only the total area size, but also it sets the critical path. A way of solving (even if partially) this problem could be using smaller dividers, at the cost of the calculation accuracy. Future analysis could be done to the better describe the tradeoff between calculation accuracy and time and area constrains and choose the optimal DIVIDERS size.</a:t>
+            </a:r>
+          </a:p>
+          <a:p>
+            <a:pPr marL="0" indent="0" algn="l">
+              <a:buNone/>
+            </a:pPr>
+            <a:r>
+              <a:rPr lang="en-US" dirty="0"/>
+              <a:t>• In our design, the number of clusters was predetermined to be eight. For future improvement, the code could be changed to allow the user to choose how many clusters to use in the algorithm.</a:t>
+            </a:r>
+          </a:p>
+          <a:p>
+            <a:pPr marL="0" indent="0" algn="l">
+              <a:buNone/>
+            </a:pPr>
+            <a:r>
+              <a:rPr lang="en-US" dirty="0"/>
+              <a:t>• In our design, the input data size and dimensions were predetermined. For future improvement, the code could be changed to allow the user to choose the input data size and dimensions of the algorithm.</a:t>
+            </a:r>
+          </a:p>
+          <a:p>
+            <a:pPr marL="0" indent="0" algn="l">
+              <a:buNone/>
+            </a:pPr>
+            <a:r>
+              <a:rPr lang="en-US" dirty="0"/>
+              <a:t>• A maximum iterations feature could be added to the design. As it is not certain the number of iterations it will take for the algorithm to reach convergence, a future register could be added enabling the user to set maximum number of iterations wanted to be ran, ending the algorithm after this predetermined number of iterations whether convergence has been achieved or not.</a:t>
+            </a:r>
+          </a:p>
+          <a:p>
+            <a:pPr marL="0" indent="0" algn="l">
+              <a:buNone/>
+            </a:pPr>
+            <a:r>
+              <a:rPr lang="en-US" dirty="0"/>
+              <a:t>• Duo to the chosen architecture of two data dependent pipelines which run in series, the clock domain could be improved by having one clock for each pipeline. In this manner, at least one of the pipelines (the slower one between the two) could have better performance, improving the overall performance. This could possible be done also for the Register File, allowing the APB communications to be faster and therefore improving even more the total performance.</a:t>
+            </a:r>
+          </a:p>
+          <a:p>
+            <a:pPr algn="l"/>
+            <a:endParaRPr lang="en-US" dirty="0"/>
+          </a:p>
+          <a:p>
+            <a:pPr algn="l"/>
+            <a:endParaRPr lang="he-IL" dirty="0"/>
+          </a:p>
+        </p:txBody>
+      </p:sp>
+      <p:sp>
+        <p:nvSpPr>
+          <p:cNvPr id="4" name="מציין מיקום של מספר שקופית 3"/>
+          <p:cNvSpPr>
+            <a:spLocks noGrp="1"/>
+          </p:cNvSpPr>
+          <p:nvPr>
+            <p:ph type="sldNum" sz="quarter" idx="5"/>
+          </p:nvPr>
+        </p:nvSpPr>
+        <p:spPr/>
+        <p:txBody>
+          <a:bodyPr/>
+          <a:lstStyle/>
+          <a:p>
+            <a:fld id="{A47A8C64-5C8B-40B3-A683-36C8893A9F2F}" type="slidenum">
+              <a:rPr lang="he-IL" smtClean="0"/>
+              <a:t>49</a:t>
+            </a:fld>
+            <a:endParaRPr lang="he-IL"/>
+          </a:p>
+        </p:txBody>
+      </p:sp>
+    </p:spTree>
+    <p:extLst>
+      <p:ext uri="{BB962C8B-B14F-4D97-AF65-F5344CB8AC3E}">
+        <p14:creationId xmlns:p14="http://schemas.microsoft.com/office/powerpoint/2010/main" val="1232629357"/>
+      </p:ext>
+    </p:extLst>
+  </p:cSld>
+  <p:clrMapOvr>
+    <a:masterClrMapping/>
+  </p:clrMapOvr>
+</p:notes>
+</file>
+
+<file path=ppt/notesSlides/notesSlide2.xml><?xml version="1.0" encoding="utf-8"?>
+<p:notes xmlns:a="http://schemas.openxmlformats.org/drawingml/2006/main" xmlns:r="http://schemas.openxmlformats.org/officeDocument/2006/relationships" xmlns:p="http://schemas.openxmlformats.org/presentationml/2006/main">
+  <p:cSld>
+    <p:spTree>
+      <p:nvGrpSpPr>
+        <p:cNvPr id="1" name=""/>
+        <p:cNvGrpSpPr/>
+        <p:nvPr/>
+      </p:nvGrpSpPr>
+      <p:grpSpPr>
+        <a:xfrm>
+          <a:off x="0" y="0"/>
+          <a:ext cx="0" cy="0"/>
+          <a:chOff x="0" y="0"/>
+          <a:chExt cx="0" cy="0"/>
+        </a:xfrm>
+      </p:grpSpPr>
+      <p:sp>
+        <p:nvSpPr>
+          <p:cNvPr id="2" name="מציין מיקום של תמונת שקופית 1"/>
+          <p:cNvSpPr>
+            <a:spLocks noGrp="1" noRot="1" noChangeAspect="1"/>
+          </p:cNvSpPr>
+          <p:nvPr>
+            <p:ph type="sldImg"/>
+          </p:nvPr>
+        </p:nvSpPr>
+        <p:spPr/>
+      </p:sp>
+      <p:sp>
+        <p:nvSpPr>
+          <p:cNvPr id="3" name="מציין מיקום של הערות 2"/>
+          <p:cNvSpPr>
+            <a:spLocks noGrp="1"/>
+          </p:cNvSpPr>
+          <p:nvPr>
+            <p:ph type="body" idx="1"/>
+          </p:nvPr>
+        </p:nvSpPr>
+        <p:spPr/>
+        <p:txBody>
+          <a:bodyPr/>
+          <a:lstStyle/>
+          <a:p>
+            <a:pPr marL="0" marR="0" lvl="0" indent="0" algn="l" defTabSz="914400" rtl="1" eaLnBrk="1" fontAlgn="auto" latinLnBrk="0" hangingPunct="1">
+              <a:lnSpc>
+                <a:spcPct val="100000"/>
+              </a:lnSpc>
+              <a:spcBef>
+                <a:spcPts val="0"/>
+              </a:spcBef>
+              <a:spcAft>
+                <a:spcPts val="0"/>
+              </a:spcAft>
+              <a:buClrTx/>
+              <a:buSzTx/>
+              <a:buFontTx/>
+              <a:buNone/>
+              <a:tabLst/>
+              <a:defRPr/>
+            </a:pPr>
+            <a:r>
+              <a:rPr lang="en-US" dirty="0"/>
+              <a:t>latency of four cycles:</a:t>
+            </a:r>
+          </a:p>
+          <a:p>
+            <a:pPr marL="0" marR="0" lvl="0" indent="0" algn="l" defTabSz="914400" rtl="1" eaLnBrk="1" fontAlgn="auto" latinLnBrk="0" hangingPunct="1">
+              <a:lnSpc>
+                <a:spcPct val="100000"/>
+              </a:lnSpc>
+              <a:spcBef>
+                <a:spcPts val="0"/>
+              </a:spcBef>
+              <a:spcAft>
+                <a:spcPts val="0"/>
+              </a:spcAft>
+              <a:buClrTx/>
+              <a:buSzTx/>
+              <a:buFontTx/>
+              <a:buNone/>
+              <a:tabLst/>
+              <a:defRPr/>
+            </a:pPr>
+            <a:r>
+              <a:rPr lang="en-US" dirty="0"/>
+              <a:t>one for reading the data from the RAM,</a:t>
+            </a:r>
+          </a:p>
+          <a:p>
+            <a:pPr marL="0" marR="0" lvl="0" indent="0" algn="l" defTabSz="914400" rtl="1" eaLnBrk="1" fontAlgn="auto" latinLnBrk="0" hangingPunct="1">
+              <a:lnSpc>
+                <a:spcPct val="100000"/>
+              </a:lnSpc>
+              <a:spcBef>
+                <a:spcPts val="0"/>
+              </a:spcBef>
+              <a:spcAft>
+                <a:spcPts val="0"/>
+              </a:spcAft>
+              <a:buClrTx/>
+              <a:buSzTx/>
+              <a:buFontTx/>
+              <a:buNone/>
+              <a:tabLst/>
+              <a:defRPr/>
+            </a:pPr>
+            <a:r>
+              <a:rPr lang="en-US" dirty="0"/>
+              <a:t>one for calculating the distance between the centroid and the point,</a:t>
+            </a:r>
+          </a:p>
+          <a:p>
+            <a:pPr marL="0" marR="0" lvl="0" indent="0" algn="l" defTabSz="914400" rtl="1" eaLnBrk="1" fontAlgn="auto" latinLnBrk="0" hangingPunct="1">
+              <a:lnSpc>
+                <a:spcPct val="100000"/>
+              </a:lnSpc>
+              <a:spcBef>
+                <a:spcPts val="0"/>
+              </a:spcBef>
+              <a:spcAft>
+                <a:spcPts val="0"/>
+              </a:spcAft>
+              <a:buClrTx/>
+              <a:buSzTx/>
+              <a:buFontTx/>
+              <a:buNone/>
+              <a:tabLst/>
+              <a:defRPr/>
+            </a:pPr>
+            <a:r>
+              <a:rPr lang="en-US" dirty="0"/>
+              <a:t>one to determine to closest centroid,</a:t>
+            </a:r>
+          </a:p>
+          <a:p>
+            <a:pPr marL="0" marR="0" lvl="0" indent="0" algn="l" defTabSz="914400" rtl="1" eaLnBrk="1" fontAlgn="auto" latinLnBrk="0" hangingPunct="1">
+              <a:lnSpc>
+                <a:spcPct val="100000"/>
+              </a:lnSpc>
+              <a:spcBef>
+                <a:spcPts val="0"/>
+              </a:spcBef>
+              <a:spcAft>
+                <a:spcPts val="0"/>
+              </a:spcAft>
+              <a:buClrTx/>
+              <a:buSzTx/>
+              <a:buFontTx/>
+              <a:buNone/>
+              <a:tabLst/>
+              <a:defRPr/>
+            </a:pPr>
+            <a:r>
+              <a:rPr lang="en-US" dirty="0"/>
+              <a:t>one for adding to point to the accumulator.</a:t>
+            </a:r>
+          </a:p>
+          <a:p>
+            <a:pPr algn="l"/>
+            <a:endParaRPr lang="he-IL" dirty="0"/>
+          </a:p>
+        </p:txBody>
+      </p:sp>
+      <p:sp>
+        <p:nvSpPr>
+          <p:cNvPr id="4" name="מציין מיקום של מספר שקופית 3"/>
+          <p:cNvSpPr>
+            <a:spLocks noGrp="1"/>
+          </p:cNvSpPr>
+          <p:nvPr>
+            <p:ph type="sldNum" sz="quarter" idx="5"/>
+          </p:nvPr>
+        </p:nvSpPr>
+        <p:spPr/>
+        <p:txBody>
+          <a:bodyPr/>
+          <a:lstStyle/>
+          <a:p>
+            <a:fld id="{A47A8C64-5C8B-40B3-A683-36C8893A9F2F}" type="slidenum">
+              <a:rPr lang="he-IL" smtClean="0"/>
+              <a:t>21</a:t>
+            </a:fld>
+            <a:endParaRPr lang="he-IL"/>
+          </a:p>
+        </p:txBody>
+      </p:sp>
+    </p:spTree>
+    <p:extLst>
+      <p:ext uri="{BB962C8B-B14F-4D97-AF65-F5344CB8AC3E}">
+        <p14:creationId xmlns:p14="http://schemas.microsoft.com/office/powerpoint/2010/main" val="2858560404"/>
+      </p:ext>
+    </p:extLst>
+  </p:cSld>
+  <p:clrMapOvr>
+    <a:masterClrMapping/>
+  </p:clrMapOvr>
+</p:notes>
+</file>
+
+<file path=ppt/notesSlides/notesSlide3.xml><?xml version="1.0" encoding="utf-8"?>
+<p:notes xmlns:a="http://schemas.openxmlformats.org/drawingml/2006/main" xmlns:r="http://schemas.openxmlformats.org/officeDocument/2006/relationships" xmlns:p="http://schemas.openxmlformats.org/presentationml/2006/main">
+  <p:cSld>
+    <p:spTree>
+      <p:nvGrpSpPr>
+        <p:cNvPr id="1" name=""/>
+        <p:cNvGrpSpPr/>
+        <p:nvPr/>
+      </p:nvGrpSpPr>
+      <p:grpSpPr>
+        <a:xfrm>
+          <a:off x="0" y="0"/>
+          <a:ext cx="0" cy="0"/>
+          <a:chOff x="0" y="0"/>
+          <a:chExt cx="0" cy="0"/>
+        </a:xfrm>
+      </p:grpSpPr>
+      <p:sp>
+        <p:nvSpPr>
+          <p:cNvPr id="2" name="מציין מיקום של תמונת שקופית 1"/>
+          <p:cNvSpPr>
+            <a:spLocks noGrp="1" noRot="1" noChangeAspect="1"/>
+          </p:cNvSpPr>
+          <p:nvPr>
+            <p:ph type="sldImg"/>
+          </p:nvPr>
+        </p:nvSpPr>
+        <p:spPr/>
+      </p:sp>
+      <p:sp>
+        <p:nvSpPr>
+          <p:cNvPr id="3" name="מציין מיקום של הערות 2"/>
+          <p:cNvSpPr>
+            <a:spLocks noGrp="1"/>
+          </p:cNvSpPr>
+          <p:nvPr>
+            <p:ph type="body" idx="1"/>
+          </p:nvPr>
+        </p:nvSpPr>
+        <p:spPr/>
+        <p:txBody>
+          <a:bodyPr/>
+          <a:lstStyle/>
+          <a:p>
+            <a:pPr marL="0" marR="0" lvl="0" indent="0" algn="l" defTabSz="914400" rtl="1" eaLnBrk="1" fontAlgn="auto" latinLnBrk="0" hangingPunct="1">
+              <a:lnSpc>
+                <a:spcPct val="100000"/>
+              </a:lnSpc>
+              <a:spcBef>
+                <a:spcPts val="0"/>
+              </a:spcBef>
+              <a:spcAft>
+                <a:spcPts val="0"/>
+              </a:spcAft>
+              <a:buClrTx/>
+              <a:buSzTx/>
+              <a:buFontTx/>
+              <a:buNone/>
+              <a:tabLst/>
+              <a:defRPr/>
+            </a:pPr>
+            <a:r>
+              <a:rPr lang="en-US" dirty="0"/>
+              <a:t>The distance calculation from the input data point (stored in the “Input register”) to the centroids, which are stored in local registers called “Centroid Register X” (X being a integer from 1 to 8). This calculation is done by o module called “Distance calculator” which is basically  two sub modules in series: the first calculates the subtraction of the data in the input register from the data in centroid register “X”, the second is a module which calculates the absolute value of the mentioned  subtraction. </a:t>
+            </a:r>
+          </a:p>
+          <a:p>
+            <a:pPr algn="l"/>
+            <a:endParaRPr lang="he-IL" dirty="0"/>
+          </a:p>
+        </p:txBody>
+      </p:sp>
+      <p:sp>
+        <p:nvSpPr>
+          <p:cNvPr id="4" name="מציין מיקום של מספר שקופית 3"/>
+          <p:cNvSpPr>
+            <a:spLocks noGrp="1"/>
+          </p:cNvSpPr>
+          <p:nvPr>
+            <p:ph type="sldNum" sz="quarter" idx="5"/>
+          </p:nvPr>
+        </p:nvSpPr>
+        <p:spPr/>
+        <p:txBody>
+          <a:bodyPr/>
+          <a:lstStyle/>
+          <a:p>
+            <a:fld id="{A47A8C64-5C8B-40B3-A683-36C8893A9F2F}" type="slidenum">
+              <a:rPr lang="he-IL" smtClean="0"/>
+              <a:t>22</a:t>
+            </a:fld>
+            <a:endParaRPr lang="he-IL"/>
+          </a:p>
+        </p:txBody>
+      </p:sp>
+    </p:spTree>
+    <p:extLst>
+      <p:ext uri="{BB962C8B-B14F-4D97-AF65-F5344CB8AC3E}">
+        <p14:creationId xmlns:p14="http://schemas.microsoft.com/office/powerpoint/2010/main" val="3899350229"/>
+      </p:ext>
+    </p:extLst>
+  </p:cSld>
+  <p:clrMapOvr>
+    <a:masterClrMapping/>
+  </p:clrMapOvr>
+</p:notes>
+</file>
+
+<file path=ppt/notesSlides/notesSlide4.xml><?xml version="1.0" encoding="utf-8"?>
+<p:notes xmlns:a="http://schemas.openxmlformats.org/drawingml/2006/main" xmlns:r="http://schemas.openxmlformats.org/officeDocument/2006/relationships" xmlns:p="http://schemas.openxmlformats.org/presentationml/2006/main">
+  <p:cSld>
+    <p:spTree>
+      <p:nvGrpSpPr>
+        <p:cNvPr id="1" name=""/>
+        <p:cNvGrpSpPr/>
+        <p:nvPr/>
+      </p:nvGrpSpPr>
+      <p:grpSpPr>
+        <a:xfrm>
+          <a:off x="0" y="0"/>
+          <a:ext cx="0" cy="0"/>
+          <a:chOff x="0" y="0"/>
+          <a:chExt cx="0" cy="0"/>
+        </a:xfrm>
+      </p:grpSpPr>
+      <p:sp>
+        <p:nvSpPr>
+          <p:cNvPr id="2" name="מציין מיקום של תמונת שקופית 1"/>
+          <p:cNvSpPr>
+            <a:spLocks noGrp="1" noRot="1" noChangeAspect="1"/>
+          </p:cNvSpPr>
+          <p:nvPr>
+            <p:ph type="sldImg"/>
+          </p:nvPr>
+        </p:nvSpPr>
+        <p:spPr/>
+      </p:sp>
+      <p:sp>
+        <p:nvSpPr>
+          <p:cNvPr id="3" name="מציין מיקום של הערות 2"/>
+          <p:cNvSpPr>
+            <a:spLocks noGrp="1"/>
+          </p:cNvSpPr>
+          <p:nvPr>
+            <p:ph type="body" idx="1"/>
+          </p:nvPr>
+        </p:nvSpPr>
+        <p:spPr/>
+        <p:txBody>
+          <a:bodyPr/>
+          <a:lstStyle/>
+          <a:p>
+            <a:pPr algn="l"/>
+            <a:r>
+              <a:rPr lang="en-US" dirty="0"/>
+              <a:t>distance calculation </a:t>
+            </a:r>
+            <a:endParaRPr lang="he-IL" dirty="0"/>
+          </a:p>
+        </p:txBody>
+      </p:sp>
+      <p:sp>
+        <p:nvSpPr>
+          <p:cNvPr id="4" name="מציין מיקום של מספר שקופית 3"/>
+          <p:cNvSpPr>
+            <a:spLocks noGrp="1"/>
+          </p:cNvSpPr>
+          <p:nvPr>
+            <p:ph type="sldNum" sz="quarter" idx="5"/>
+          </p:nvPr>
+        </p:nvSpPr>
+        <p:spPr/>
+        <p:txBody>
+          <a:bodyPr/>
+          <a:lstStyle/>
+          <a:p>
+            <a:fld id="{A47A8C64-5C8B-40B3-A683-36C8893A9F2F}" type="slidenum">
+              <a:rPr lang="he-IL" smtClean="0"/>
+              <a:t>23</a:t>
+            </a:fld>
+            <a:endParaRPr lang="he-IL"/>
+          </a:p>
+        </p:txBody>
+      </p:sp>
+    </p:spTree>
+    <p:extLst>
+      <p:ext uri="{BB962C8B-B14F-4D97-AF65-F5344CB8AC3E}">
+        <p14:creationId xmlns:p14="http://schemas.microsoft.com/office/powerpoint/2010/main" val="4182274364"/>
+      </p:ext>
+    </p:extLst>
+  </p:cSld>
+  <p:clrMapOvr>
+    <a:masterClrMapping/>
+  </p:clrMapOvr>
+</p:notes>
+</file>
+
+<file path=ppt/notesSlides/notesSlide5.xml><?xml version="1.0" encoding="utf-8"?>
+<p:notes xmlns:a="http://schemas.openxmlformats.org/drawingml/2006/main" xmlns:r="http://schemas.openxmlformats.org/officeDocument/2006/relationships" xmlns:p="http://schemas.openxmlformats.org/presentationml/2006/main">
+  <p:cSld>
+    <p:spTree>
+      <p:nvGrpSpPr>
+        <p:cNvPr id="1" name=""/>
+        <p:cNvGrpSpPr/>
+        <p:nvPr/>
+      </p:nvGrpSpPr>
+      <p:grpSpPr>
+        <a:xfrm>
+          <a:off x="0" y="0"/>
+          <a:ext cx="0" cy="0"/>
+          <a:chOff x="0" y="0"/>
+          <a:chExt cx="0" cy="0"/>
+        </a:xfrm>
+      </p:grpSpPr>
+      <p:sp>
+        <p:nvSpPr>
+          <p:cNvPr id="2" name="מציין מיקום של תמונת שקופית 1"/>
+          <p:cNvSpPr>
+            <a:spLocks noGrp="1" noRot="1" noChangeAspect="1"/>
+          </p:cNvSpPr>
+          <p:nvPr>
+            <p:ph type="sldImg"/>
+          </p:nvPr>
+        </p:nvSpPr>
+        <p:spPr/>
+      </p:sp>
+      <p:sp>
+        <p:nvSpPr>
+          <p:cNvPr id="3" name="מציין מיקום של הערות 2"/>
+          <p:cNvSpPr>
+            <a:spLocks noGrp="1"/>
+          </p:cNvSpPr>
+          <p:nvPr>
+            <p:ph type="body" idx="1"/>
+          </p:nvPr>
+        </p:nvSpPr>
+        <p:spPr/>
+        <p:txBody>
+          <a:bodyPr/>
+          <a:lstStyle/>
+          <a:p>
+            <a:pPr marL="0" marR="0" lvl="0" indent="0" algn="l" defTabSz="914400" rtl="1" eaLnBrk="1" fontAlgn="auto" latinLnBrk="0" hangingPunct="1">
+              <a:lnSpc>
+                <a:spcPct val="100000"/>
+              </a:lnSpc>
+              <a:spcBef>
+                <a:spcPts val="0"/>
+              </a:spcBef>
+              <a:spcAft>
+                <a:spcPts val="0"/>
+              </a:spcAft>
+              <a:buClrTx/>
+              <a:buSzTx/>
+              <a:buFontTx/>
+              <a:buNone/>
+              <a:tabLst/>
+              <a:defRPr/>
+            </a:pPr>
+            <a:r>
+              <a:rPr lang="en-US" dirty="0"/>
+              <a:t>The component consist sixteen registers: eight accumulators registers and eight counters registers.</a:t>
+            </a:r>
+          </a:p>
+          <a:p>
+            <a:pPr marL="0" marR="0" lvl="0" indent="0" algn="l" defTabSz="914400" rtl="1" eaLnBrk="1" fontAlgn="auto" latinLnBrk="0" hangingPunct="1">
+              <a:lnSpc>
+                <a:spcPct val="100000"/>
+              </a:lnSpc>
+              <a:spcBef>
+                <a:spcPts val="0"/>
+              </a:spcBef>
+              <a:spcAft>
+                <a:spcPts val="0"/>
+              </a:spcAft>
+              <a:buClrTx/>
+              <a:buSzTx/>
+              <a:buFontTx/>
+              <a:buNone/>
+              <a:tabLst/>
+              <a:defRPr/>
+            </a:pPr>
+            <a:endParaRPr lang="he-IL" dirty="0"/>
+          </a:p>
+          <a:p>
+            <a:pPr marL="0" marR="0" lvl="0" indent="0" algn="l" defTabSz="914400" rtl="1" eaLnBrk="1" fontAlgn="auto" latinLnBrk="0" hangingPunct="1">
+              <a:lnSpc>
+                <a:spcPct val="100000"/>
+              </a:lnSpc>
+              <a:spcBef>
+                <a:spcPts val="0"/>
+              </a:spcBef>
+              <a:spcAft>
+                <a:spcPts val="0"/>
+              </a:spcAft>
+              <a:buClrTx/>
+              <a:buSzTx/>
+              <a:buFontTx/>
+              <a:buNone/>
+              <a:tabLst/>
+              <a:defRPr/>
+            </a:pPr>
+            <a:r>
+              <a:rPr lang="en-US" dirty="0"/>
+              <a:t>Each accumulator represents a cluster and stores the summed of all points assign to this cluster at a given time. The counters are register which simply keep track of how many points were assigned to each </a:t>
+            </a:r>
+            <a:r>
+              <a:rPr lang="en-US" dirty="0" err="1"/>
+              <a:t>cluste</a:t>
+            </a:r>
+            <a:r>
+              <a:rPr lang="en-US" dirty="0"/>
+              <a:t>	The index received from the previous part is used as a selector for two decoders, in order to choose to each accumulator, register and counter register the input data point should be added. </a:t>
+            </a:r>
+            <a:endParaRPr lang="he-IL" dirty="0"/>
+          </a:p>
+        </p:txBody>
+      </p:sp>
+      <p:sp>
+        <p:nvSpPr>
+          <p:cNvPr id="4" name="מציין מיקום של מספר שקופית 3"/>
+          <p:cNvSpPr>
+            <a:spLocks noGrp="1"/>
+          </p:cNvSpPr>
+          <p:nvPr>
+            <p:ph type="sldNum" sz="quarter" idx="5"/>
+          </p:nvPr>
+        </p:nvSpPr>
+        <p:spPr/>
+        <p:txBody>
+          <a:bodyPr/>
+          <a:lstStyle/>
+          <a:p>
+            <a:fld id="{A47A8C64-5C8B-40B3-A683-36C8893A9F2F}" type="slidenum">
+              <a:rPr lang="he-IL" smtClean="0"/>
+              <a:t>24</a:t>
+            </a:fld>
+            <a:endParaRPr lang="he-IL"/>
+          </a:p>
+        </p:txBody>
+      </p:sp>
+    </p:spTree>
+    <p:extLst>
+      <p:ext uri="{BB962C8B-B14F-4D97-AF65-F5344CB8AC3E}">
+        <p14:creationId xmlns:p14="http://schemas.microsoft.com/office/powerpoint/2010/main" val="1970069588"/>
+      </p:ext>
+    </p:extLst>
+  </p:cSld>
+  <p:clrMapOvr>
+    <a:masterClrMapping/>
+  </p:clrMapOvr>
+</p:notes>
+</file>
+
+<file path=ppt/notesSlides/notesSlide6.xml><?xml version="1.0" encoding="utf-8"?>
+<p:notes xmlns:a="http://schemas.openxmlformats.org/drawingml/2006/main" xmlns:r="http://schemas.openxmlformats.org/officeDocument/2006/relationships" xmlns:p="http://schemas.openxmlformats.org/presentationml/2006/main">
+  <p:cSld>
+    <p:spTree>
+      <p:nvGrpSpPr>
+        <p:cNvPr id="1" name=""/>
+        <p:cNvGrpSpPr/>
+        <p:nvPr/>
+      </p:nvGrpSpPr>
+      <p:grpSpPr>
+        <a:xfrm>
+          <a:off x="0" y="0"/>
+          <a:ext cx="0" cy="0"/>
+          <a:chOff x="0" y="0"/>
+          <a:chExt cx="0" cy="0"/>
+        </a:xfrm>
+      </p:grpSpPr>
+      <p:sp>
+        <p:nvSpPr>
+          <p:cNvPr id="2" name="מציין מיקום של תמונת שקופית 1"/>
+          <p:cNvSpPr>
+            <a:spLocks noGrp="1" noRot="1" noChangeAspect="1"/>
+          </p:cNvSpPr>
+          <p:nvPr>
+            <p:ph type="sldImg"/>
+          </p:nvPr>
+        </p:nvSpPr>
+        <p:spPr/>
+      </p:sp>
+      <p:sp>
+        <p:nvSpPr>
+          <p:cNvPr id="3" name="מציין מיקום של הערות 2"/>
+          <p:cNvSpPr>
+            <a:spLocks noGrp="1"/>
+          </p:cNvSpPr>
+          <p:nvPr>
+            <p:ph type="body" idx="1"/>
+          </p:nvPr>
+        </p:nvSpPr>
+        <p:spPr/>
+        <p:txBody>
+          <a:bodyPr/>
+          <a:lstStyle/>
+          <a:p>
+            <a:pPr algn="l"/>
+            <a:r>
+              <a:rPr lang="en-US" dirty="0"/>
+              <a:t>Duo to the complexity and time demanding characteristics of the floating point representation, the proposed architecture works with the fixed point representation.  Therefore, there was a need to find a proper way to divide fixed point values. </a:t>
+            </a:r>
+            <a:endParaRPr lang="he-IL" dirty="0"/>
+          </a:p>
+          <a:p>
+            <a:pPr algn="l"/>
+            <a:endParaRPr lang="en-US" dirty="0"/>
+          </a:p>
+          <a:p>
+            <a:pPr algn="l"/>
+            <a:r>
+              <a:rPr lang="en-US" dirty="0"/>
+              <a:t>The proposed method was to convert the fixed point number to an integer by shifting all fractional bits left (multiplying by 1024 ), dividing the converted number by using an integer divider(with known an simple algorithms, as describe in section Division in Hardware in the project report), and after the division shifting right the result in order to return to the fixed point representation.</a:t>
+            </a:r>
+          </a:p>
+          <a:p>
+            <a:pPr algn="l"/>
+            <a:endParaRPr lang="en-US" dirty="0"/>
+          </a:p>
+          <a:p>
+            <a:pPr algn="l"/>
+            <a:endParaRPr lang="he-IL" dirty="0"/>
+          </a:p>
+        </p:txBody>
+      </p:sp>
+      <p:sp>
+        <p:nvSpPr>
+          <p:cNvPr id="4" name="מציין מיקום של מספר שקופית 3"/>
+          <p:cNvSpPr>
+            <a:spLocks noGrp="1"/>
+          </p:cNvSpPr>
+          <p:nvPr>
+            <p:ph type="sldNum" sz="quarter" idx="5"/>
+          </p:nvPr>
+        </p:nvSpPr>
+        <p:spPr/>
+        <p:txBody>
+          <a:bodyPr/>
+          <a:lstStyle/>
+          <a:p>
+            <a:fld id="{A47A8C64-5C8B-40B3-A683-36C8893A9F2F}" type="slidenum">
+              <a:rPr lang="he-IL" smtClean="0"/>
+              <a:t>25</a:t>
+            </a:fld>
+            <a:endParaRPr lang="he-IL"/>
+          </a:p>
+        </p:txBody>
+      </p:sp>
+    </p:spTree>
+    <p:extLst>
+      <p:ext uri="{BB962C8B-B14F-4D97-AF65-F5344CB8AC3E}">
+        <p14:creationId xmlns:p14="http://schemas.microsoft.com/office/powerpoint/2010/main" val="836587795"/>
+      </p:ext>
+    </p:extLst>
+  </p:cSld>
+  <p:clrMapOvr>
+    <a:masterClrMapping/>
+  </p:clrMapOvr>
+</p:notes>
+</file>
+
+<file path=ppt/notesSlides/notesSlide7.xml><?xml version="1.0" encoding="utf-8"?>
+<p:notes xmlns:a="http://schemas.openxmlformats.org/drawingml/2006/main" xmlns:r="http://schemas.openxmlformats.org/officeDocument/2006/relationships" xmlns:p="http://schemas.openxmlformats.org/presentationml/2006/main">
+  <p:cSld>
+    <p:spTree>
+      <p:nvGrpSpPr>
+        <p:cNvPr id="1" name=""/>
+        <p:cNvGrpSpPr/>
+        <p:nvPr/>
+      </p:nvGrpSpPr>
+      <p:grpSpPr>
+        <a:xfrm>
+          <a:off x="0" y="0"/>
+          <a:ext cx="0" cy="0"/>
+          <a:chOff x="0" y="0"/>
+          <a:chExt cx="0" cy="0"/>
+        </a:xfrm>
+      </p:grpSpPr>
+      <p:sp>
+        <p:nvSpPr>
+          <p:cNvPr id="2" name="מציין מיקום של תמונת שקופית 1"/>
+          <p:cNvSpPr>
+            <a:spLocks noGrp="1" noRot="1" noChangeAspect="1"/>
+          </p:cNvSpPr>
+          <p:nvPr>
+            <p:ph type="sldImg"/>
+          </p:nvPr>
+        </p:nvSpPr>
+        <p:spPr/>
+      </p:sp>
+      <p:sp>
+        <p:nvSpPr>
+          <p:cNvPr id="3" name="מציין מיקום של הערות 2"/>
+          <p:cNvSpPr>
+            <a:spLocks noGrp="1"/>
+          </p:cNvSpPr>
+          <p:nvPr>
+            <p:ph type="body" idx="1"/>
+          </p:nvPr>
+        </p:nvSpPr>
+        <p:spPr/>
+        <p:txBody>
+          <a:bodyPr/>
+          <a:lstStyle/>
+          <a:p>
+            <a:pPr marL="0" marR="0" lvl="0" indent="0" algn="l" defTabSz="914400" rtl="1" eaLnBrk="1" fontAlgn="auto" latinLnBrk="0" hangingPunct="1">
+              <a:lnSpc>
+                <a:spcPct val="100000"/>
+              </a:lnSpc>
+              <a:spcBef>
+                <a:spcPts val="0"/>
+              </a:spcBef>
+              <a:spcAft>
+                <a:spcPts val="0"/>
+              </a:spcAft>
+              <a:buClrTx/>
+              <a:buSzTx/>
+              <a:buFontTx/>
+              <a:buNone/>
+              <a:tabLst/>
+              <a:defRPr/>
+            </a:pPr>
+            <a:r>
+              <a:rPr lang="en-US" dirty="0"/>
+              <a:t>The “New Means Calculation block” is responsible for centroids update step of the algorithm. It does so by dividing the value of each accumulator(stored at the local “Accumulator reg” register in the “Classification block”) by the number of points assigned to  them(stored at the local “Accumulator counter reg” register in the “Classification block”). </a:t>
+            </a:r>
+          </a:p>
+          <a:p>
+            <a:pPr algn="l"/>
+            <a:endParaRPr lang="he-IL" dirty="0"/>
+          </a:p>
+        </p:txBody>
+      </p:sp>
+      <p:sp>
+        <p:nvSpPr>
+          <p:cNvPr id="4" name="מציין מיקום של מספר שקופית 3"/>
+          <p:cNvSpPr>
+            <a:spLocks noGrp="1"/>
+          </p:cNvSpPr>
+          <p:nvPr>
+            <p:ph type="sldNum" sz="quarter" idx="5"/>
+          </p:nvPr>
+        </p:nvSpPr>
+        <p:spPr/>
+        <p:txBody>
+          <a:bodyPr/>
+          <a:lstStyle/>
+          <a:p>
+            <a:fld id="{A47A8C64-5C8B-40B3-A683-36C8893A9F2F}" type="slidenum">
+              <a:rPr lang="he-IL" smtClean="0"/>
+              <a:t>26</a:t>
+            </a:fld>
+            <a:endParaRPr lang="he-IL"/>
+          </a:p>
+        </p:txBody>
+      </p:sp>
+    </p:spTree>
+    <p:extLst>
+      <p:ext uri="{BB962C8B-B14F-4D97-AF65-F5344CB8AC3E}">
+        <p14:creationId xmlns:p14="http://schemas.microsoft.com/office/powerpoint/2010/main" val="3019220895"/>
+      </p:ext>
+    </p:extLst>
+  </p:cSld>
+  <p:clrMapOvr>
+    <a:masterClrMapping/>
+  </p:clrMapOvr>
+</p:notes>
+</file>
+
+<file path=ppt/notesSlides/notesSlide8.xml><?xml version="1.0" encoding="utf-8"?>
+<p:notes xmlns:a="http://schemas.openxmlformats.org/drawingml/2006/main" xmlns:r="http://schemas.openxmlformats.org/officeDocument/2006/relationships" xmlns:p="http://schemas.openxmlformats.org/presentationml/2006/main">
+  <p:cSld>
+    <p:spTree>
+      <p:nvGrpSpPr>
+        <p:cNvPr id="1" name=""/>
+        <p:cNvGrpSpPr/>
+        <p:nvPr/>
+      </p:nvGrpSpPr>
+      <p:grpSpPr>
+        <a:xfrm>
+          <a:off x="0" y="0"/>
+          <a:ext cx="0" cy="0"/>
+          <a:chOff x="0" y="0"/>
+          <a:chExt cx="0" cy="0"/>
+        </a:xfrm>
+      </p:grpSpPr>
+      <p:sp>
+        <p:nvSpPr>
+          <p:cNvPr id="2" name="מציין מיקום של תמונת שקופית 1"/>
+          <p:cNvSpPr>
+            <a:spLocks noGrp="1" noRot="1" noChangeAspect="1"/>
+          </p:cNvSpPr>
+          <p:nvPr>
+            <p:ph type="sldImg"/>
+          </p:nvPr>
+        </p:nvSpPr>
+        <p:spPr/>
+      </p:sp>
+      <p:sp>
+        <p:nvSpPr>
+          <p:cNvPr id="3" name="מציין מיקום של הערות 2"/>
+          <p:cNvSpPr>
+            <a:spLocks noGrp="1"/>
+          </p:cNvSpPr>
+          <p:nvPr>
+            <p:ph type="body" idx="1"/>
+          </p:nvPr>
+        </p:nvSpPr>
+        <p:spPr/>
+        <p:txBody>
+          <a:bodyPr/>
+          <a:lstStyle/>
+          <a:p>
+            <a:pPr algn="l"/>
+            <a:r>
+              <a:rPr lang="en-US" dirty="0"/>
+              <a:t>The convergence check block is responsible for the convergence check step of the algorithm. It does so by checking if any of the new centroids calculated in the “New Means Calculation block” value is close enough (within a pre-decided threshold stored at “Threshold register ” in the register file) to its old value(the value stored in the beginning of the iteration, stored in local registers of the classification block). </a:t>
+            </a:r>
+            <a:endParaRPr lang="he-IL" dirty="0"/>
+          </a:p>
+          <a:p>
+            <a:pPr algn="l"/>
+            <a:endParaRPr lang="en-US" dirty="0"/>
+          </a:p>
+          <a:p>
+            <a:pPr algn="l"/>
+            <a:endParaRPr lang="en-US" dirty="0"/>
+          </a:p>
+          <a:p>
+            <a:pPr algn="l"/>
+            <a:endParaRPr lang="he-IL" dirty="0"/>
+          </a:p>
+        </p:txBody>
+      </p:sp>
+      <p:sp>
+        <p:nvSpPr>
+          <p:cNvPr id="4" name="מציין מיקום של מספר שקופית 3"/>
+          <p:cNvSpPr>
+            <a:spLocks noGrp="1"/>
+          </p:cNvSpPr>
+          <p:nvPr>
+            <p:ph type="sldNum" sz="quarter" idx="5"/>
+          </p:nvPr>
+        </p:nvSpPr>
+        <p:spPr/>
+        <p:txBody>
+          <a:bodyPr/>
+          <a:lstStyle/>
+          <a:p>
+            <a:fld id="{A47A8C64-5C8B-40B3-A683-36C8893A9F2F}" type="slidenum">
+              <a:rPr lang="he-IL" smtClean="0"/>
+              <a:t>27</a:t>
+            </a:fld>
+            <a:endParaRPr lang="he-IL"/>
+          </a:p>
+        </p:txBody>
+      </p:sp>
+    </p:spTree>
+    <p:extLst>
+      <p:ext uri="{BB962C8B-B14F-4D97-AF65-F5344CB8AC3E}">
+        <p14:creationId xmlns:p14="http://schemas.microsoft.com/office/powerpoint/2010/main" val="1570971760"/>
+      </p:ext>
+    </p:extLst>
+  </p:cSld>
+  <p:clrMapOvr>
+    <a:masterClrMapping/>
+  </p:clrMapOvr>
+</p:notes>
+</file>
+
+<file path=ppt/notesSlides/notesSlide9.xml><?xml version="1.0" encoding="utf-8"?>
+<p:notes xmlns:a="http://schemas.openxmlformats.org/drawingml/2006/main" xmlns:r="http://schemas.openxmlformats.org/officeDocument/2006/relationships" xmlns:p="http://schemas.openxmlformats.org/presentationml/2006/main">
+  <p:cSld>
+    <p:spTree>
+      <p:nvGrpSpPr>
+        <p:cNvPr id="1" name=""/>
+        <p:cNvGrpSpPr/>
+        <p:nvPr/>
+      </p:nvGrpSpPr>
+      <p:grpSpPr>
+        <a:xfrm>
+          <a:off x="0" y="0"/>
+          <a:ext cx="0" cy="0"/>
+          <a:chOff x="0" y="0"/>
+          <a:chExt cx="0" cy="0"/>
+        </a:xfrm>
+      </p:grpSpPr>
+      <p:sp>
+        <p:nvSpPr>
+          <p:cNvPr id="2" name="מציין מיקום של תמונת שקופית 1"/>
+          <p:cNvSpPr>
+            <a:spLocks noGrp="1" noRot="1" noChangeAspect="1"/>
+          </p:cNvSpPr>
+          <p:nvPr>
+            <p:ph type="sldImg"/>
+          </p:nvPr>
+        </p:nvSpPr>
+        <p:spPr/>
+      </p:sp>
+      <p:sp>
+        <p:nvSpPr>
+          <p:cNvPr id="3" name="מציין מיקום של הערות 2"/>
+          <p:cNvSpPr>
+            <a:spLocks noGrp="1"/>
+          </p:cNvSpPr>
+          <p:nvPr>
+            <p:ph type="body" idx="1"/>
+          </p:nvPr>
+        </p:nvSpPr>
+        <p:spPr/>
+        <p:txBody>
+          <a:bodyPr/>
+          <a:lstStyle/>
+          <a:p>
+            <a:pPr marL="0" marR="0" lvl="0" indent="0" algn="l" defTabSz="914400" rtl="1" eaLnBrk="1" fontAlgn="auto" latinLnBrk="0" hangingPunct="1">
+              <a:lnSpc>
+                <a:spcPct val="100000"/>
+              </a:lnSpc>
+              <a:spcBef>
+                <a:spcPts val="0"/>
+              </a:spcBef>
+              <a:spcAft>
+                <a:spcPts val="0"/>
+              </a:spcAft>
+              <a:buClrTx/>
+              <a:buSzTx/>
+              <a:buFontTx/>
+              <a:buNone/>
+              <a:tabLst/>
+              <a:defRPr/>
+            </a:pPr>
+            <a:r>
+              <a:rPr lang="en-US" dirty="0"/>
+              <a:t>K means core pipeline view is divided into two pipelines, the division can be seen in the figure attached. The reason for this division is the Read-After-Write dependency between the 2 pipes.</a:t>
+            </a:r>
+            <a:br>
+              <a:rPr lang="en-US" dirty="0"/>
+            </a:br>
+            <a:r>
+              <a:rPr lang="en-US" dirty="0"/>
+              <a:t>This results by having one pipe working while the other wait for it's results. The left pipe result is all data points classified to clusters, which then can be used to calculate the new means for next iteration (or the last means if there will be a convergence). Then for the next iteration of classifying the data points, the new means value has to be ready, therefore the first pipe will "sleep" until second pipe will finish bringing the result of calculating new means</a:t>
+            </a:r>
+          </a:p>
+          <a:p>
+            <a:pPr algn="l"/>
+            <a:endParaRPr lang="he-IL" dirty="0"/>
+          </a:p>
+        </p:txBody>
+      </p:sp>
+      <p:sp>
+        <p:nvSpPr>
+          <p:cNvPr id="4" name="מציין מיקום של מספר שקופית 3"/>
+          <p:cNvSpPr>
+            <a:spLocks noGrp="1"/>
+          </p:cNvSpPr>
+          <p:nvPr>
+            <p:ph type="sldNum" sz="quarter" idx="5"/>
+          </p:nvPr>
+        </p:nvSpPr>
+        <p:spPr/>
+        <p:txBody>
+          <a:bodyPr/>
+          <a:lstStyle/>
+          <a:p>
+            <a:fld id="{A47A8C64-5C8B-40B3-A683-36C8893A9F2F}" type="slidenum">
+              <a:rPr lang="he-IL" smtClean="0"/>
+              <a:t>29</a:t>
+            </a:fld>
+            <a:endParaRPr lang="he-IL"/>
+          </a:p>
+        </p:txBody>
+      </p:sp>
+    </p:spTree>
+    <p:extLst>
+      <p:ext uri="{BB962C8B-B14F-4D97-AF65-F5344CB8AC3E}">
+        <p14:creationId xmlns:p14="http://schemas.microsoft.com/office/powerpoint/2010/main" val="426622170"/>
       </p:ext>
     </p:extLst>
   </p:cSld>
@@ -11413,8 +11542,8 @@
           </a:ln>
         </p:spPr>
       </p:pic>
-      <mc:AlternateContent xmlns:mc="http://schemas.openxmlformats.org/markup-compatibility/2006">
-        <mc:Choice xmlns:a14="http://schemas.microsoft.com/office/drawing/2010/main" Requires="a14">
+      <mc:AlternateContent xmlns:mc="http://schemas.openxmlformats.org/markup-compatibility/2006" xmlns:a14="http://schemas.microsoft.com/office/drawing/2010/main">
+        <mc:Choice Requires="a14">
           <p:sp>
             <p:nvSpPr>
               <p:cNvPr id="7" name="Content Placeholder 2">
@@ -11912,7 +12041,7 @@
             </p:txBody>
           </p:sp>
         </mc:Choice>
-        <mc:Fallback>
+        <mc:Fallback xmlns="">
           <p:sp>
             <p:nvSpPr>
               <p:cNvPr id="7" name="Content Placeholder 2">
@@ -12083,8 +12212,8 @@
           <a:chExt cx="0" cy="0"/>
         </a:xfrm>
       </p:grpSpPr>
-      <mc:AlternateContent xmlns:mc="http://schemas.openxmlformats.org/markup-compatibility/2006">
-        <mc:Choice xmlns:a14="http://schemas.microsoft.com/office/drawing/2010/main" Requires="a14">
+      <mc:AlternateContent xmlns:mc="http://schemas.openxmlformats.org/markup-compatibility/2006" xmlns:a14="http://schemas.microsoft.com/office/drawing/2010/main">
+        <mc:Choice Requires="a14">
           <p:sp>
             <p:nvSpPr>
               <p:cNvPr id="3" name="מציין מיקום תוכן 2">
@@ -12372,7 +12501,7 @@
             </p:txBody>
           </p:sp>
         </mc:Choice>
-        <mc:Fallback>
+        <mc:Fallback xmlns="">
           <p:sp>
             <p:nvSpPr>
               <p:cNvPr id="3" name="מציין מיקום תוכן 2">
@@ -12597,8 +12726,8 @@
           </a:p>
         </p:txBody>
       </p:sp>
-      <mc:AlternateContent xmlns:mc="http://schemas.openxmlformats.org/markup-compatibility/2006">
-        <mc:Choice xmlns:a14="http://schemas.microsoft.com/office/drawing/2010/main" Requires="a14">
+      <mc:AlternateContent xmlns:mc="http://schemas.openxmlformats.org/markup-compatibility/2006" xmlns:a14="http://schemas.microsoft.com/office/drawing/2010/main">
+        <mc:Choice Requires="a14">
           <p:sp>
             <p:nvSpPr>
               <p:cNvPr id="11" name="מלבן 10">
@@ -12632,6 +12761,7 @@
                 </a:r>
               </a:p>
               <a:p>
+                <a:pPr/>
                 <a14:m>
                   <m:oMathPara xmlns:m="http://schemas.openxmlformats.org/officeDocument/2006/math">
                     <m:oMathParaPr>
@@ -12757,6 +12887,7 @@
                 <a:endParaRPr lang="en-US" dirty="0"/>
               </a:p>
               <a:p>
+                <a:pPr/>
                 <a14:m>
                   <m:oMathPara xmlns:m="http://schemas.openxmlformats.org/officeDocument/2006/math">
                     <m:oMathParaPr>
@@ -12867,7 +12998,7 @@
             </p:txBody>
           </p:sp>
         </mc:Choice>
-        <mc:Fallback>
+        <mc:Fallback xmlns="">
           <p:sp>
             <p:nvSpPr>
               <p:cNvPr id="11" name="מלבן 10">
@@ -13038,8 +13169,8 @@
           <a:chExt cx="0" cy="0"/>
         </a:xfrm>
       </p:grpSpPr>
-      <mc:AlternateContent xmlns:mc="http://schemas.openxmlformats.org/markup-compatibility/2006">
-        <mc:Choice xmlns:a14="http://schemas.microsoft.com/office/drawing/2010/main" Requires="a14">
+      <mc:AlternateContent xmlns:mc="http://schemas.openxmlformats.org/markup-compatibility/2006" xmlns:a14="http://schemas.microsoft.com/office/drawing/2010/main">
+        <mc:Choice Requires="a14">
           <p:sp>
             <p:nvSpPr>
               <p:cNvPr id="3" name="מציין מיקום תוכן 2">
@@ -13358,7 +13489,7 @@
             </p:txBody>
           </p:sp>
         </mc:Choice>
-        <mc:Fallback>
+        <mc:Fallback xmlns="">
           <p:sp>
             <p:nvSpPr>
               <p:cNvPr id="3" name="מציין מיקום תוכן 2">
@@ -13522,8 +13653,8 @@
           </a:p>
         </p:txBody>
       </p:sp>
-      <mc:AlternateContent xmlns:mc="http://schemas.openxmlformats.org/markup-compatibility/2006">
-        <mc:Choice xmlns:a14="http://schemas.microsoft.com/office/drawing/2010/main" Requires="a14">
+      <mc:AlternateContent xmlns:mc="http://schemas.openxmlformats.org/markup-compatibility/2006" xmlns:a14="http://schemas.microsoft.com/office/drawing/2010/main">
+        <mc:Choice Requires="a14">
           <p:sp>
             <p:nvSpPr>
               <p:cNvPr id="3" name="Content Placeholder 2">
@@ -13827,7 +13958,7 @@
             </p:txBody>
           </p:sp>
         </mc:Choice>
-        <mc:Fallback>
+        <mc:Fallback xmlns="">
           <p:sp>
             <p:nvSpPr>
               <p:cNvPr id="3" name="Content Placeholder 2">

</xml_diff>